<commit_message>
Update to version 0.8 from Portia
</commit_message>
<xml_diff>
--- a/The Fellowship of the Ring.pptx
+++ b/The Fellowship of the Ring.pptx
@@ -25,7 +25,7 @@
     <p:sldId id="296" r:id="rId16"/>
     <p:sldId id="278" r:id="rId17"/>
     <p:sldId id="271" r:id="rId18"/>
-    <p:sldId id="282" r:id="rId19"/>
+    <p:sldId id="297" r:id="rId19"/>
     <p:sldId id="267" r:id="rId20"/>
     <p:sldId id="283" r:id="rId21"/>
     <p:sldId id="288" r:id="rId22"/>
@@ -7759,7 +7759,7 @@
             <a:noFill/>
           </a:ln>
           <a:extLst>
-            <a:ext uri="{91240B29-F687-4F45-9708-019B960494DF}">
+            <a:ext uri="{91240B29-F687-4f45-9708-019B960494DF}">
               <a14:hiddenLine xmlns:a14="http://schemas.microsoft.com/office/drawing/2010/main" w="9525">
                 <a:solidFill>
                   <a:srgbClr val="000000"/>
@@ -7785,7 +7785,7 @@
   <p:timing>
     <p:tnLst>
       <p:par>
-        <p:cTn id="1" dur="indefinite" restart="never" nodeType="tmRoot"/>
+        <p:cTn xmlns:p14="http://schemas.microsoft.com/office/powerpoint/2010/main" id="1" dur="indefinite" restart="never" nodeType="tmRoot"/>
       </p:par>
     </p:tnLst>
   </p:timing>
@@ -8837,7 +8837,7 @@
   <p:timing>
     <p:tnLst>
       <p:par>
-        <p:cTn id="1" dur="indefinite" restart="never" nodeType="tmRoot">
+        <p:cTn xmlns:p14="http://schemas.microsoft.com/office/powerpoint/2010/main" id="1" dur="indefinite" restart="never" nodeType="tmRoot">
           <p:childTnLst>
             <p:seq concurrent="1" nextAc="seek">
               <p:cTn id="2" dur="indefinite" nodeType="mainSeq">
@@ -9279,7 +9279,7 @@
   <p:timing>
     <p:tnLst>
       <p:par>
-        <p:cTn id="1" dur="indefinite" restart="never" nodeType="tmRoot"/>
+        <p:cTn xmlns:p14="http://schemas.microsoft.com/office/powerpoint/2010/main" id="1" dur="indefinite" restart="never" nodeType="tmRoot"/>
       </p:par>
     </p:tnLst>
   </p:timing>
@@ -9379,7 +9379,7 @@
   <p:timing>
     <p:tnLst>
       <p:par>
-        <p:cTn id="1" dur="indefinite" restart="never" nodeType="tmRoot"/>
+        <p:cTn xmlns:p14="http://schemas.microsoft.com/office/powerpoint/2010/main" id="1" dur="indefinite" restart="never" nodeType="tmRoot"/>
       </p:par>
     </p:tnLst>
   </p:timing>
@@ -10390,7 +10390,7 @@
   <p:timing>
     <p:tnLst>
       <p:par>
-        <p:cTn id="1" dur="indefinite" restart="never" nodeType="tmRoot">
+        <p:cTn xmlns:p14="http://schemas.microsoft.com/office/powerpoint/2010/main" id="1" dur="indefinite" restart="never" nodeType="tmRoot">
           <p:childTnLst>
             <p:seq concurrent="1" nextAc="seek">
               <p:cTn id="2" dur="indefinite" nodeType="mainSeq">
@@ -12405,7 +12405,7 @@
   <p:timing>
     <p:tnLst>
       <p:par>
-        <p:cTn id="1" dur="indefinite" restart="never" nodeType="tmRoot">
+        <p:cTn xmlns:p14="http://schemas.microsoft.com/office/powerpoint/2010/main" id="1" dur="indefinite" restart="never" nodeType="tmRoot">
           <p:childTnLst>
             <p:seq concurrent="1" nextAc="seek">
               <p:cTn id="2" dur="indefinite" nodeType="mainSeq">
@@ -13591,7 +13591,7 @@
   <p:timing>
     <p:tnLst>
       <p:par>
-        <p:cTn id="1" dur="indefinite" restart="never" nodeType="tmRoot">
+        <p:cTn xmlns:p14="http://schemas.microsoft.com/office/powerpoint/2010/main" id="1" dur="indefinite" restart="never" nodeType="tmRoot">
           <p:childTnLst>
             <p:seq concurrent="1" nextAc="seek">
               <p:cTn id="2" dur="indefinite" nodeType="mainSeq">
@@ -15104,8 +15104,8 @@
         </p:nvSpPr>
         <p:spPr>
           <a:xfrm>
-            <a:off x="3807293" y="2383984"/>
-            <a:ext cx="935199" cy="461665"/>
+            <a:off x="3033356" y="2383984"/>
+            <a:ext cx="1682660" cy="276999"/>
           </a:xfrm>
           <a:prstGeom prst="rect">
             <a:avLst/>
@@ -15118,7 +15118,7 @@
           </a:bodyPr>
           <a:lstStyle/>
           <a:p>
-            <a:pPr algn="ctr"/>
+            <a:pPr algn="r"/>
             <a:r>
               <a:rPr lang="en-US" sz="1200" b="1" dirty="0" smtClean="0">
                 <a:solidFill>
@@ -15127,7 +15127,17 @@
                   </a:schemeClr>
                 </a:solidFill>
               </a:rPr>
-              <a:t>Mutual learning</a:t>
+              <a:t>Mutual </a:t>
+            </a:r>
+            <a:r>
+              <a:rPr lang="en-US" sz="1200" b="1" dirty="0" smtClean="0">
+                <a:solidFill>
+                  <a:schemeClr val="bg2">
+                    <a:lumMod val="25000"/>
+                  </a:schemeClr>
+                </a:solidFill>
+              </a:rPr>
+              <a:t>Learning</a:t>
             </a:r>
             <a:endParaRPr lang="en-US" sz="1200" b="1" dirty="0">
               <a:solidFill>
@@ -15147,8 +15157,8 @@
         </p:nvSpPr>
         <p:spPr>
           <a:xfrm>
-            <a:off x="2559537" y="3630318"/>
-            <a:ext cx="935199" cy="646331"/>
+            <a:off x="2411759" y="3630318"/>
+            <a:ext cx="1082977" cy="461665"/>
           </a:xfrm>
           <a:prstGeom prst="rect">
             <a:avLst/>
@@ -15170,7 +15180,17 @@
                   </a:schemeClr>
                 </a:solidFill>
               </a:rPr>
-              <a:t>Unilateral Control bias</a:t>
+              <a:t>Unilateral Control </a:t>
+            </a:r>
+            <a:r>
+              <a:rPr lang="en-US" sz="1200" b="1" dirty="0" smtClean="0">
+                <a:solidFill>
+                  <a:schemeClr val="bg2">
+                    <a:lumMod val="25000"/>
+                  </a:schemeClr>
+                </a:solidFill>
+              </a:rPr>
+              <a:t>Bias</a:t>
             </a:r>
             <a:endParaRPr lang="en-US" sz="1200" b="1" dirty="0">
               <a:solidFill>
@@ -15204,7 +15224,7 @@
           </a:bodyPr>
           <a:lstStyle/>
           <a:p>
-            <a:pPr algn="ctr"/>
+            <a:pPr algn="r"/>
             <a:r>
               <a:rPr lang="en-US" sz="800" b="1" dirty="0" smtClean="0">
                 <a:solidFill>
@@ -15675,8 +15695,8 @@
         </p:nvSpPr>
         <p:spPr>
           <a:xfrm>
-            <a:off x="2655686" y="2999688"/>
-            <a:ext cx="1481631" cy="461665"/>
+            <a:off x="2699792" y="3005477"/>
+            <a:ext cx="1405347" cy="461665"/>
           </a:xfrm>
           <a:prstGeom prst="rect">
             <a:avLst/>
@@ -15689,7 +15709,7 @@
           </a:bodyPr>
           <a:lstStyle/>
           <a:p>
-            <a:pPr algn="ctr"/>
+            <a:pPr algn="r"/>
             <a:r>
               <a:rPr lang="en-US" sz="1200" b="1" dirty="0" smtClean="0">
                 <a:solidFill>
@@ -15698,7 +15718,17 @@
                   </a:schemeClr>
                 </a:solidFill>
               </a:rPr>
-              <a:t>Mutual learning bias</a:t>
+              <a:t>Mutual </a:t>
+            </a:r>
+            <a:r>
+              <a:rPr lang="en-US" sz="1200" b="1" dirty="0" smtClean="0">
+                <a:solidFill>
+                  <a:schemeClr val="bg2">
+                    <a:lumMod val="25000"/>
+                  </a:schemeClr>
+                </a:solidFill>
+              </a:rPr>
+              <a:t>Learning Bias</a:t>
             </a:r>
             <a:endParaRPr lang="en-US" sz="1200" b="1" dirty="0">
               <a:solidFill>
@@ -15731,7 +15761,7 @@
   <p:timing>
     <p:tnLst>
       <p:par>
-        <p:cTn id="1" dur="indefinite" restart="never" nodeType="tmRoot">
+        <p:cTn xmlns:p14="http://schemas.microsoft.com/office/powerpoint/2010/main" id="1" dur="indefinite" restart="never" nodeType="tmRoot">
           <p:childTnLst>
             <p:seq concurrent="1" nextAc="seek">
               <p:cTn id="2" dur="indefinite" nodeType="mainSeq">
@@ -16547,7 +16577,7 @@
   <p:timing>
     <p:tnLst>
       <p:par>
-        <p:cTn id="1" dur="indefinite" restart="never" nodeType="tmRoot"/>
+        <p:cTn xmlns:p14="http://schemas.microsoft.com/office/powerpoint/2010/main" id="1" dur="indefinite" restart="never" nodeType="tmRoot"/>
       </p:par>
     </p:tnLst>
   </p:timing>
@@ -16594,52 +16624,370 @@
           </a:p>
         </p:txBody>
       </p:sp>
-      <p:sp>
-        <p:nvSpPr>
-          <p:cNvPr id="3" name="Content Placeholder 2"/>
-          <p:cNvSpPr>
-            <a:spLocks noGrp="1"/>
-          </p:cNvSpPr>
-          <p:nvPr>
-            <p:ph idx="1"/>
-          </p:nvPr>
-        </p:nvSpPr>
-        <p:spPr/>
-        <p:txBody>
-          <a:bodyPr>
-            <a:normAutofit/>
-          </a:bodyPr>
-          <a:lstStyle/>
-          <a:p>
-            <a:r>
-              <a:rPr lang="en-GB" sz="2800" dirty="0" smtClean="0"/>
-              <a:t>Applied the Mutual Learning Scale to ourselves</a:t>
-            </a:r>
-          </a:p>
-          <a:p>
-            <a:r>
-              <a:rPr lang="en-GB" sz="2800" dirty="0" smtClean="0"/>
-              <a:t>Learned about the Mutual Learning Model</a:t>
-            </a:r>
-          </a:p>
-          <a:p>
-            <a:r>
-              <a:rPr lang="en-GB" sz="2800" dirty="0" smtClean="0"/>
-              <a:t>Learned about the 8 behaviours</a:t>
-            </a:r>
-          </a:p>
-          <a:p>
-            <a:r>
-              <a:rPr lang="en-GB" sz="2800" dirty="0" smtClean="0"/>
-              <a:t>Identified ways we can apply the concepts</a:t>
-            </a:r>
-          </a:p>
-        </p:txBody>
-      </p:sp>
+      <p:pic>
+        <p:nvPicPr>
+          <p:cNvPr id="4" name="Picture 3" descr="Slide05.jpg"/>
+          <p:cNvPicPr>
+            <a:picLocks noChangeAspect="1"/>
+          </p:cNvPicPr>
+          <p:nvPr/>
+        </p:nvPicPr>
+        <p:blipFill>
+          <a:blip r:embed="rId3">
+            <a:extLst>
+              <a:ext uri="{28A0092B-C50C-407E-A947-70E740481C1C}">
+                <a14:useLocalDpi xmlns:a14="http://schemas.microsoft.com/office/drawing/2010/main" val="0"/>
+              </a:ext>
+            </a:extLst>
+          </a:blip>
+          <a:stretch>
+            <a:fillRect/>
+          </a:stretch>
+        </p:blipFill>
+        <p:spPr>
+          <a:xfrm>
+            <a:off x="498459" y="1810178"/>
+            <a:ext cx="2915816" cy="2186862"/>
+          </a:xfrm>
+          <a:prstGeom prst="rect">
+            <a:avLst/>
+          </a:prstGeom>
+          <a:solidFill>
+            <a:srgbClr val="FFFFFF">
+              <a:shade val="85000"/>
+            </a:srgbClr>
+          </a:solidFill>
+          <a:ln w="88900" cap="sq">
+            <a:solidFill>
+              <a:srgbClr val="FFFFFF"/>
+            </a:solidFill>
+            <a:miter lim="800000"/>
+          </a:ln>
+          <a:effectLst>
+            <a:outerShdw blurRad="55000" dist="18000" dir="5400000" algn="tl" rotWithShape="0">
+              <a:srgbClr val="000000">
+                <a:alpha val="40000"/>
+              </a:srgbClr>
+            </a:outerShdw>
+          </a:effectLst>
+          <a:scene3d>
+            <a:camera prst="orthographicFront"/>
+            <a:lightRig rig="twoPt" dir="t">
+              <a:rot lat="0" lon="0" rev="7200000"/>
+            </a:lightRig>
+          </a:scene3d>
+          <a:sp3d>
+            <a:bevelT w="25400" h="19050"/>
+            <a:contourClr>
+              <a:srgbClr val="FFFFFF"/>
+            </a:contourClr>
+          </a:sp3d>
+        </p:spPr>
+      </p:pic>
+      <p:pic>
+        <p:nvPicPr>
+          <p:cNvPr id="5" name="Picture 4" descr="Slide14.jpg"/>
+          <p:cNvPicPr>
+            <a:picLocks noChangeAspect="1"/>
+          </p:cNvPicPr>
+          <p:nvPr/>
+        </p:nvPicPr>
+        <p:blipFill>
+          <a:blip r:embed="rId4">
+            <a:extLst>
+              <a:ext uri="{28A0092B-C50C-407E-A947-70E740481C1C}">
+                <a14:useLocalDpi xmlns:a14="http://schemas.microsoft.com/office/drawing/2010/main" val="0"/>
+              </a:ext>
+            </a:extLst>
+          </a:blip>
+          <a:stretch>
+            <a:fillRect/>
+          </a:stretch>
+        </p:blipFill>
+        <p:spPr>
+          <a:xfrm>
+            <a:off x="5148064" y="1844824"/>
+            <a:ext cx="3168352" cy="2376264"/>
+          </a:xfrm>
+          <a:prstGeom prst="rect">
+            <a:avLst/>
+          </a:prstGeom>
+          <a:solidFill>
+            <a:srgbClr val="FFFFFF">
+              <a:shade val="85000"/>
+            </a:srgbClr>
+          </a:solidFill>
+          <a:ln w="88900" cap="sq">
+            <a:solidFill>
+              <a:srgbClr val="FFFFFF"/>
+            </a:solidFill>
+            <a:miter lim="800000"/>
+          </a:ln>
+          <a:effectLst>
+            <a:outerShdw blurRad="55000" dist="18000" dir="5400000" algn="tl" rotWithShape="0">
+              <a:srgbClr val="000000">
+                <a:alpha val="40000"/>
+              </a:srgbClr>
+            </a:outerShdw>
+          </a:effectLst>
+          <a:scene3d>
+            <a:camera prst="orthographicFront"/>
+            <a:lightRig rig="twoPt" dir="t">
+              <a:rot lat="0" lon="0" rev="7200000"/>
+            </a:lightRig>
+          </a:scene3d>
+          <a:sp3d>
+            <a:bevelT w="25400" h="19050"/>
+            <a:contourClr>
+              <a:srgbClr val="FFFFFF"/>
+            </a:contourClr>
+          </a:sp3d>
+        </p:spPr>
+      </p:pic>
+      <p:pic>
+        <p:nvPicPr>
+          <p:cNvPr id="6" name="Picture 5" descr="Slide15.jpg"/>
+          <p:cNvPicPr>
+            <a:picLocks noChangeAspect="1"/>
+          </p:cNvPicPr>
+          <p:nvPr/>
+        </p:nvPicPr>
+        <p:blipFill>
+          <a:blip r:embed="rId5">
+            <a:extLst>
+              <a:ext uri="{28A0092B-C50C-407E-A947-70E740481C1C}">
+                <a14:useLocalDpi xmlns:a14="http://schemas.microsoft.com/office/drawing/2010/main" val="0"/>
+              </a:ext>
+            </a:extLst>
+          </a:blip>
+          <a:stretch>
+            <a:fillRect/>
+          </a:stretch>
+        </p:blipFill>
+        <p:spPr>
+          <a:xfrm>
+            <a:off x="5512288" y="3645024"/>
+            <a:ext cx="3168352" cy="2376264"/>
+          </a:xfrm>
+          <a:prstGeom prst="rect">
+            <a:avLst/>
+          </a:prstGeom>
+          <a:solidFill>
+            <a:srgbClr val="FFFFFF">
+              <a:shade val="85000"/>
+            </a:srgbClr>
+          </a:solidFill>
+          <a:ln w="88900" cap="sq">
+            <a:solidFill>
+              <a:srgbClr val="FFFFFF"/>
+            </a:solidFill>
+            <a:miter lim="800000"/>
+          </a:ln>
+          <a:effectLst>
+            <a:outerShdw blurRad="55000" dist="18000" dir="5400000" algn="tl" rotWithShape="0">
+              <a:srgbClr val="000000">
+                <a:alpha val="40000"/>
+              </a:srgbClr>
+            </a:outerShdw>
+          </a:effectLst>
+          <a:scene3d>
+            <a:camera prst="orthographicFront"/>
+            <a:lightRig rig="twoPt" dir="t">
+              <a:rot lat="0" lon="0" rev="7200000"/>
+            </a:lightRig>
+          </a:scene3d>
+          <a:sp3d>
+            <a:bevelT w="25400" h="19050"/>
+            <a:contourClr>
+              <a:srgbClr val="FFFFFF"/>
+            </a:contourClr>
+          </a:sp3d>
+        </p:spPr>
+      </p:pic>
+      <p:pic>
+        <p:nvPicPr>
+          <p:cNvPr id="9" name="Picture 8" descr="Slide07.jpg"/>
+          <p:cNvPicPr>
+            <a:picLocks noChangeAspect="1"/>
+          </p:cNvPicPr>
+          <p:nvPr/>
+        </p:nvPicPr>
+        <p:blipFill>
+          <a:blip r:embed="rId6">
+            <a:extLst>
+              <a:ext uri="{28A0092B-C50C-407E-A947-70E740481C1C}">
+                <a14:useLocalDpi xmlns:a14="http://schemas.microsoft.com/office/drawing/2010/main" val="0"/>
+              </a:ext>
+            </a:extLst>
+          </a:blip>
+          <a:stretch>
+            <a:fillRect/>
+          </a:stretch>
+        </p:blipFill>
+        <p:spPr>
+          <a:xfrm>
+            <a:off x="947597" y="2492896"/>
+            <a:ext cx="2952328" cy="2160239"/>
+          </a:xfrm>
+          <a:prstGeom prst="rect">
+            <a:avLst/>
+          </a:prstGeom>
+          <a:solidFill>
+            <a:srgbClr val="FFFFFF">
+              <a:shade val="85000"/>
+            </a:srgbClr>
+          </a:solidFill>
+          <a:ln w="88900" cap="sq">
+            <a:solidFill>
+              <a:srgbClr val="FFFFFF"/>
+            </a:solidFill>
+            <a:miter lim="800000"/>
+          </a:ln>
+          <a:effectLst>
+            <a:outerShdw blurRad="55000" dist="18000" dir="5400000" algn="tl" rotWithShape="0">
+              <a:srgbClr val="000000">
+                <a:alpha val="40000"/>
+              </a:srgbClr>
+            </a:outerShdw>
+          </a:effectLst>
+          <a:scene3d>
+            <a:camera prst="orthographicFront"/>
+            <a:lightRig rig="twoPt" dir="t">
+              <a:rot lat="0" lon="0" rev="7200000"/>
+            </a:lightRig>
+          </a:scene3d>
+          <a:sp3d>
+            <a:bevelT w="25400" h="19050"/>
+            <a:contourClr>
+              <a:srgbClr val="FFFFFF"/>
+            </a:contourClr>
+          </a:sp3d>
+        </p:spPr>
+      </p:pic>
+      <p:pic>
+        <p:nvPicPr>
+          <p:cNvPr id="10" name="Picture 9" descr="Slide10.jpg"/>
+          <p:cNvPicPr>
+            <a:picLocks noChangeAspect="1"/>
+          </p:cNvPicPr>
+          <p:nvPr/>
+        </p:nvPicPr>
+        <p:blipFill>
+          <a:blip r:embed="rId7">
+            <a:extLst>
+              <a:ext uri="{28A0092B-C50C-407E-A947-70E740481C1C}">
+                <a14:useLocalDpi xmlns:a14="http://schemas.microsoft.com/office/drawing/2010/main" val="0"/>
+              </a:ext>
+            </a:extLst>
+          </a:blip>
+          <a:stretch>
+            <a:fillRect/>
+          </a:stretch>
+        </p:blipFill>
+        <p:spPr>
+          <a:xfrm>
+            <a:off x="1357155" y="3063885"/>
+            <a:ext cx="2976330" cy="2232248"/>
+          </a:xfrm>
+          <a:prstGeom prst="rect">
+            <a:avLst/>
+          </a:prstGeom>
+          <a:solidFill>
+            <a:srgbClr val="FFFFFF">
+              <a:shade val="85000"/>
+            </a:srgbClr>
+          </a:solidFill>
+          <a:ln w="88900" cap="sq">
+            <a:solidFill>
+              <a:srgbClr val="FFFFFF"/>
+            </a:solidFill>
+            <a:miter lim="800000"/>
+          </a:ln>
+          <a:effectLst>
+            <a:outerShdw blurRad="55000" dist="18000" dir="5400000" algn="tl" rotWithShape="0">
+              <a:srgbClr val="000000">
+                <a:alpha val="40000"/>
+              </a:srgbClr>
+            </a:outerShdw>
+          </a:effectLst>
+          <a:scene3d>
+            <a:camera prst="orthographicFront"/>
+            <a:lightRig rig="twoPt" dir="t">
+              <a:rot lat="0" lon="0" rev="7200000"/>
+            </a:lightRig>
+          </a:scene3d>
+          <a:sp3d>
+            <a:bevelT w="25400" h="19050"/>
+            <a:contourClr>
+              <a:srgbClr val="FFFFFF"/>
+            </a:contourClr>
+          </a:sp3d>
+        </p:spPr>
+      </p:pic>
+      <p:pic>
+        <p:nvPicPr>
+          <p:cNvPr id="11" name="Picture 10" descr="Slide13.jpg"/>
+          <p:cNvPicPr>
+            <a:picLocks noChangeAspect="1"/>
+          </p:cNvPicPr>
+          <p:nvPr/>
+        </p:nvPicPr>
+        <p:blipFill>
+          <a:blip r:embed="rId8">
+            <a:extLst>
+              <a:ext uri="{28A0092B-C50C-407E-A947-70E740481C1C}">
+                <a14:useLocalDpi xmlns:a14="http://schemas.microsoft.com/office/drawing/2010/main" val="0"/>
+              </a:ext>
+            </a:extLst>
+          </a:blip>
+          <a:stretch>
+            <a:fillRect/>
+          </a:stretch>
+        </p:blipFill>
+        <p:spPr>
+          <a:xfrm>
+            <a:off x="1739685" y="3789040"/>
+            <a:ext cx="2976331" cy="2232248"/>
+          </a:xfrm>
+          <a:prstGeom prst="rect">
+            <a:avLst/>
+          </a:prstGeom>
+          <a:solidFill>
+            <a:srgbClr val="FFFFFF">
+              <a:shade val="85000"/>
+            </a:srgbClr>
+          </a:solidFill>
+          <a:ln w="88900" cap="sq">
+            <a:solidFill>
+              <a:srgbClr val="FFFFFF"/>
+            </a:solidFill>
+            <a:miter lim="800000"/>
+          </a:ln>
+          <a:effectLst>
+            <a:outerShdw blurRad="55000" dist="18000" dir="5400000" algn="tl" rotWithShape="0">
+              <a:srgbClr val="000000">
+                <a:alpha val="40000"/>
+              </a:srgbClr>
+            </a:outerShdw>
+          </a:effectLst>
+          <a:scene3d>
+            <a:camera prst="orthographicFront"/>
+            <a:lightRig rig="twoPt" dir="t">
+              <a:rot lat="0" lon="0" rev="7200000"/>
+            </a:lightRig>
+          </a:scene3d>
+          <a:sp3d>
+            <a:bevelT w="25400" h="19050"/>
+            <a:contourClr>
+              <a:srgbClr val="FFFFFF"/>
+            </a:contourClr>
+          </a:sp3d>
+        </p:spPr>
+      </p:pic>
     </p:spTree>
     <p:extLst>
       <p:ext uri="{BB962C8B-B14F-4D97-AF65-F5344CB8AC3E}">
-        <p14:creationId xmlns:p14="http://schemas.microsoft.com/office/powerpoint/2010/main" val="225589894"/>
+        <p14:creationId xmlns:p14="http://schemas.microsoft.com/office/powerpoint/2010/main" val="4221590431"/>
       </p:ext>
     </p:extLst>
   </p:cSld>
@@ -16649,7 +16997,300 @@
   <p:timing>
     <p:tnLst>
       <p:par>
-        <p:cTn id="1" dur="indefinite" restart="never" nodeType="tmRoot"/>
+        <p:cTn xmlns:p14="http://schemas.microsoft.com/office/powerpoint/2010/main" id="1" dur="indefinite" restart="never" nodeType="tmRoot">
+          <p:childTnLst>
+            <p:seq concurrent="1" nextAc="seek">
+              <p:cTn id="2" dur="indefinite" nodeType="mainSeq">
+                <p:childTnLst>
+                  <p:par>
+                    <p:cTn id="3" fill="hold">
+                      <p:stCondLst>
+                        <p:cond delay="indefinite"/>
+                      </p:stCondLst>
+                      <p:childTnLst>
+                        <p:par>
+                          <p:cTn id="4" fill="hold">
+                            <p:stCondLst>
+                              <p:cond delay="0"/>
+                            </p:stCondLst>
+                            <p:childTnLst>
+                              <p:par>
+                                <p:cTn id="5" presetID="1" presetClass="entr" presetSubtype="0" fill="hold" nodeType="clickEffect">
+                                  <p:stCondLst>
+                                    <p:cond delay="0"/>
+                                  </p:stCondLst>
+                                  <p:childTnLst>
+                                    <p:set>
+                                      <p:cBhvr>
+                                        <p:cTn id="6" dur="1" fill="hold">
+                                          <p:stCondLst>
+                                            <p:cond delay="0"/>
+                                          </p:stCondLst>
+                                        </p:cTn>
+                                        <p:tgtEl>
+                                          <p:spTgt spid="4"/>
+                                        </p:tgtEl>
+                                        <p:attrNameLst>
+                                          <p:attrName>style.visibility</p:attrName>
+                                        </p:attrNameLst>
+                                      </p:cBhvr>
+                                      <p:to>
+                                        <p:strVal val="visible"/>
+                                      </p:to>
+                                    </p:set>
+                                  </p:childTnLst>
+                                </p:cTn>
+                              </p:par>
+                            </p:childTnLst>
+                          </p:cTn>
+                        </p:par>
+                      </p:childTnLst>
+                    </p:cTn>
+                  </p:par>
+                  <p:par>
+                    <p:cTn id="7" fill="hold">
+                      <p:stCondLst>
+                        <p:cond delay="indefinite"/>
+                      </p:stCondLst>
+                      <p:childTnLst>
+                        <p:par>
+                          <p:cTn id="8" fill="hold">
+                            <p:stCondLst>
+                              <p:cond delay="0"/>
+                            </p:stCondLst>
+                            <p:childTnLst>
+                              <p:par>
+                                <p:cTn id="9" presetID="1" presetClass="entr" presetSubtype="0" fill="hold" nodeType="clickEffect">
+                                  <p:stCondLst>
+                                    <p:cond delay="0"/>
+                                  </p:stCondLst>
+                                  <p:childTnLst>
+                                    <p:set>
+                                      <p:cBhvr>
+                                        <p:cTn id="10" dur="1" fill="hold">
+                                          <p:stCondLst>
+                                            <p:cond delay="0"/>
+                                          </p:stCondLst>
+                                        </p:cTn>
+                                        <p:tgtEl>
+                                          <p:spTgt spid="9"/>
+                                        </p:tgtEl>
+                                        <p:attrNameLst>
+                                          <p:attrName>style.visibility</p:attrName>
+                                        </p:attrNameLst>
+                                      </p:cBhvr>
+                                      <p:to>
+                                        <p:strVal val="visible"/>
+                                      </p:to>
+                                    </p:set>
+                                  </p:childTnLst>
+                                </p:cTn>
+                              </p:par>
+                            </p:childTnLst>
+                          </p:cTn>
+                        </p:par>
+                      </p:childTnLst>
+                    </p:cTn>
+                  </p:par>
+                  <p:par>
+                    <p:cTn id="11" fill="hold">
+                      <p:stCondLst>
+                        <p:cond delay="indefinite"/>
+                      </p:stCondLst>
+                      <p:childTnLst>
+                        <p:par>
+                          <p:cTn id="12" fill="hold">
+                            <p:stCondLst>
+                              <p:cond delay="0"/>
+                            </p:stCondLst>
+                            <p:childTnLst>
+                              <p:par>
+                                <p:cTn id="13" presetID="1" presetClass="entr" presetSubtype="0" fill="hold" nodeType="clickEffect">
+                                  <p:stCondLst>
+                                    <p:cond delay="0"/>
+                                  </p:stCondLst>
+                                  <p:childTnLst>
+                                    <p:set>
+                                      <p:cBhvr>
+                                        <p:cTn id="14" dur="1" fill="hold">
+                                          <p:stCondLst>
+                                            <p:cond delay="0"/>
+                                          </p:stCondLst>
+                                        </p:cTn>
+                                        <p:tgtEl>
+                                          <p:spTgt spid="10"/>
+                                        </p:tgtEl>
+                                        <p:attrNameLst>
+                                          <p:attrName>style.visibility</p:attrName>
+                                        </p:attrNameLst>
+                                      </p:cBhvr>
+                                      <p:to>
+                                        <p:strVal val="visible"/>
+                                      </p:to>
+                                    </p:set>
+                                  </p:childTnLst>
+                                </p:cTn>
+                              </p:par>
+                            </p:childTnLst>
+                          </p:cTn>
+                        </p:par>
+                      </p:childTnLst>
+                    </p:cTn>
+                  </p:par>
+                  <p:par>
+                    <p:cTn id="15" fill="hold">
+                      <p:stCondLst>
+                        <p:cond delay="indefinite"/>
+                      </p:stCondLst>
+                      <p:childTnLst>
+                        <p:par>
+                          <p:cTn id="16" fill="hold">
+                            <p:stCondLst>
+                              <p:cond delay="0"/>
+                            </p:stCondLst>
+                            <p:childTnLst>
+                              <p:par>
+                                <p:cTn id="17" presetID="1" presetClass="entr" presetSubtype="0" fill="hold" nodeType="clickEffect">
+                                  <p:stCondLst>
+                                    <p:cond delay="0"/>
+                                  </p:stCondLst>
+                                  <p:childTnLst>
+                                    <p:set>
+                                      <p:cBhvr>
+                                        <p:cTn id="18" dur="1" fill="hold">
+                                          <p:stCondLst>
+                                            <p:cond delay="0"/>
+                                          </p:stCondLst>
+                                        </p:cTn>
+                                        <p:tgtEl>
+                                          <p:spTgt spid="11"/>
+                                        </p:tgtEl>
+                                        <p:attrNameLst>
+                                          <p:attrName>style.visibility</p:attrName>
+                                        </p:attrNameLst>
+                                      </p:cBhvr>
+                                      <p:to>
+                                        <p:strVal val="visible"/>
+                                      </p:to>
+                                    </p:set>
+                                  </p:childTnLst>
+                                </p:cTn>
+                              </p:par>
+                            </p:childTnLst>
+                          </p:cTn>
+                        </p:par>
+                      </p:childTnLst>
+                    </p:cTn>
+                  </p:par>
+                  <p:par>
+                    <p:cTn id="19" fill="hold">
+                      <p:stCondLst>
+                        <p:cond delay="indefinite"/>
+                      </p:stCondLst>
+                      <p:childTnLst>
+                        <p:par>
+                          <p:cTn id="20" fill="hold">
+                            <p:stCondLst>
+                              <p:cond delay="0"/>
+                            </p:stCondLst>
+                            <p:childTnLst>
+                              <p:par>
+                                <p:cTn id="21" presetID="1" presetClass="entr" presetSubtype="0" fill="hold" nodeType="clickEffect">
+                                  <p:stCondLst>
+                                    <p:cond delay="0"/>
+                                  </p:stCondLst>
+                                  <p:childTnLst>
+                                    <p:set>
+                                      <p:cBhvr>
+                                        <p:cTn id="22" dur="1" fill="hold">
+                                          <p:stCondLst>
+                                            <p:cond delay="0"/>
+                                          </p:stCondLst>
+                                        </p:cTn>
+                                        <p:tgtEl>
+                                          <p:spTgt spid="5"/>
+                                        </p:tgtEl>
+                                        <p:attrNameLst>
+                                          <p:attrName>style.visibility</p:attrName>
+                                        </p:attrNameLst>
+                                      </p:cBhvr>
+                                      <p:to>
+                                        <p:strVal val="visible"/>
+                                      </p:to>
+                                    </p:set>
+                                  </p:childTnLst>
+                                </p:cTn>
+                              </p:par>
+                            </p:childTnLst>
+                          </p:cTn>
+                        </p:par>
+                      </p:childTnLst>
+                    </p:cTn>
+                  </p:par>
+                  <p:par>
+                    <p:cTn id="23" fill="hold">
+                      <p:stCondLst>
+                        <p:cond delay="indefinite"/>
+                      </p:stCondLst>
+                      <p:childTnLst>
+                        <p:par>
+                          <p:cTn id="24" fill="hold">
+                            <p:stCondLst>
+                              <p:cond delay="0"/>
+                            </p:stCondLst>
+                            <p:childTnLst>
+                              <p:par>
+                                <p:cTn id="25" presetID="1" presetClass="entr" presetSubtype="0" fill="hold" nodeType="clickEffect">
+                                  <p:stCondLst>
+                                    <p:cond delay="0"/>
+                                  </p:stCondLst>
+                                  <p:childTnLst>
+                                    <p:set>
+                                      <p:cBhvr>
+                                        <p:cTn id="26" dur="1" fill="hold">
+                                          <p:stCondLst>
+                                            <p:cond delay="0"/>
+                                          </p:stCondLst>
+                                        </p:cTn>
+                                        <p:tgtEl>
+                                          <p:spTgt spid="6"/>
+                                        </p:tgtEl>
+                                        <p:attrNameLst>
+                                          <p:attrName>style.visibility</p:attrName>
+                                        </p:attrNameLst>
+                                      </p:cBhvr>
+                                      <p:to>
+                                        <p:strVal val="visible"/>
+                                      </p:to>
+                                    </p:set>
+                                  </p:childTnLst>
+                                </p:cTn>
+                              </p:par>
+                            </p:childTnLst>
+                          </p:cTn>
+                        </p:par>
+                      </p:childTnLst>
+                    </p:cTn>
+                  </p:par>
+                </p:childTnLst>
+              </p:cTn>
+              <p:prevCondLst>
+                <p:cond evt="onPrev" delay="0">
+                  <p:tgtEl>
+                    <p:sldTgt/>
+                  </p:tgtEl>
+                </p:cond>
+              </p:prevCondLst>
+              <p:nextCondLst>
+                <p:cond evt="onNext" delay="0">
+                  <p:tgtEl>
+                    <p:sldTgt/>
+                  </p:tgtEl>
+                </p:cond>
+              </p:nextCondLst>
+            </p:seq>
+          </p:childTnLst>
+        </p:cTn>
       </p:par>
     </p:tnLst>
   </p:timing>
@@ -16825,7 +17466,7 @@
         </p:blipFill>
         <p:spPr>
           <a:xfrm>
-            <a:off x="6876256" y="3140968"/>
+            <a:off x="7058985" y="3315940"/>
             <a:ext cx="1545463" cy="2345308"/>
           </a:xfrm>
           <a:prstGeom prst="rect">
@@ -16856,7 +17497,7 @@
   <p:timing>
     <p:tnLst>
       <p:par>
-        <p:cTn id="1" dur="indefinite" restart="never" nodeType="tmRoot"/>
+        <p:cTn xmlns:p14="http://schemas.microsoft.com/office/powerpoint/2010/main" id="1" dur="indefinite" restart="never" nodeType="tmRoot"/>
       </p:par>
     </p:tnLst>
   </p:timing>
@@ -16962,7 +17603,7 @@
   <p:timing>
     <p:tnLst>
       <p:par>
-        <p:cTn id="1" dur="indefinite" restart="never" nodeType="tmRoot"/>
+        <p:cTn xmlns:p14="http://schemas.microsoft.com/office/powerpoint/2010/main" id="1" dur="indefinite" restart="never" nodeType="tmRoot"/>
       </p:par>
     </p:tnLst>
   </p:timing>
@@ -17144,7 +17785,7 @@
   <p:timing>
     <p:tnLst>
       <p:par>
-        <p:cTn id="1" dur="indefinite" restart="never" nodeType="tmRoot"/>
+        <p:cTn xmlns:p14="http://schemas.microsoft.com/office/powerpoint/2010/main" id="1" dur="indefinite" restart="never" nodeType="tmRoot"/>
       </p:par>
     </p:tnLst>
   </p:timing>
@@ -17273,14 +17914,14 @@
           </a:ln>
           <a:effectLst/>
           <a:extLst>
-            <a:ext uri="{909E8E84-426E-40DD-AFC4-6F175D3DCCD1}">
+            <a:ext uri="{909E8E84-426E-40dd-AFC4-6F175D3DCCD1}">
               <a14:hiddenFill xmlns:a14="http://schemas.microsoft.com/office/drawing/2010/main">
                 <a:solidFill>
                   <a:schemeClr val="accent1"/>
                 </a:solidFill>
               </a14:hiddenFill>
             </a:ext>
-            <a:ext uri="{91240B29-F687-4F45-9708-019B960494DF}">
+            <a:ext uri="{91240B29-F687-4f45-9708-019B960494DF}">
               <a14:hiddenLine xmlns:a14="http://schemas.microsoft.com/office/drawing/2010/main" w="9525">
                 <a:solidFill>
                   <a:schemeClr val="tx1"/>
@@ -17290,7 +17931,7 @@
                 <a:tailEnd/>
               </a14:hiddenLine>
             </a:ext>
-            <a:ext uri="{AF507438-7753-43E0-B8FC-AC1667EBCBE1}">
+            <a:ext uri="{AF507438-7753-43e0-B8FC-AC1667EBCBE1}">
               <a14:hiddenEffects xmlns:a14="http://schemas.microsoft.com/office/drawing/2010/main">
                 <a:effectLst>
                   <a:outerShdw blurRad="63500" dist="38099" dir="2700000" algn="ctr" rotWithShape="0">
@@ -17350,14 +17991,14 @@
           </a:ln>
           <a:effectLst/>
           <a:extLst>
-            <a:ext uri="{909E8E84-426E-40DD-AFC4-6F175D3DCCD1}">
+            <a:ext uri="{909E8E84-426E-40dd-AFC4-6F175D3DCCD1}">
               <a14:hiddenFill xmlns:a14="http://schemas.microsoft.com/office/drawing/2010/main">
                 <a:solidFill>
                   <a:schemeClr val="accent1"/>
                 </a:solidFill>
               </a14:hiddenFill>
             </a:ext>
-            <a:ext uri="{91240B29-F687-4F45-9708-019B960494DF}">
+            <a:ext uri="{91240B29-F687-4f45-9708-019B960494DF}">
               <a14:hiddenLine xmlns:a14="http://schemas.microsoft.com/office/drawing/2010/main" w="9525">
                 <a:solidFill>
                   <a:schemeClr val="tx1"/>
@@ -17367,7 +18008,7 @@
                 <a:tailEnd/>
               </a14:hiddenLine>
             </a:ext>
-            <a:ext uri="{AF507438-7753-43E0-B8FC-AC1667EBCBE1}">
+            <a:ext uri="{AF507438-7753-43e0-B8FC-AC1667EBCBE1}">
               <a14:hiddenEffects xmlns:a14="http://schemas.microsoft.com/office/drawing/2010/main">
                 <a:effectLst>
                   <a:outerShdw blurRad="63500" dist="38099" dir="2700000" algn="ctr" rotWithShape="0">
@@ -17496,14 +18137,14 @@
           </a:ln>
           <a:effectLst/>
           <a:extLst>
-            <a:ext uri="{909E8E84-426E-40DD-AFC4-6F175D3DCCD1}">
+            <a:ext uri="{909E8E84-426E-40dd-AFC4-6F175D3DCCD1}">
               <a14:hiddenFill xmlns:a14="http://schemas.microsoft.com/office/drawing/2010/main">
                 <a:solidFill>
                   <a:schemeClr val="accent1"/>
                 </a:solidFill>
               </a14:hiddenFill>
             </a:ext>
-            <a:ext uri="{91240B29-F687-4F45-9708-019B960494DF}">
+            <a:ext uri="{91240B29-F687-4f45-9708-019B960494DF}">
               <a14:hiddenLine xmlns:a14="http://schemas.microsoft.com/office/drawing/2010/main" w="9525">
                 <a:solidFill>
                   <a:schemeClr val="tx1"/>
@@ -17513,7 +18154,7 @@
                 <a:tailEnd/>
               </a14:hiddenLine>
             </a:ext>
-            <a:ext uri="{AF507438-7753-43E0-B8FC-AC1667EBCBE1}">
+            <a:ext uri="{AF507438-7753-43e0-B8FC-AC1667EBCBE1}">
               <a14:hiddenEffects xmlns:a14="http://schemas.microsoft.com/office/drawing/2010/main">
                 <a:effectLst>
                   <a:outerShdw blurRad="63500" dist="38099" dir="2700000" algn="ctr" rotWithShape="0">
@@ -17777,7 +18418,7 @@
             <a:tailEnd/>
           </a:ln>
           <a:extLst>
-            <a:ext uri="{909E8E84-426E-40DD-AFC4-6F175D3DCCD1}">
+            <a:ext uri="{909E8E84-426E-40dd-AFC4-6F175D3DCCD1}">
               <a14:hiddenFill xmlns:a14="http://schemas.microsoft.com/office/drawing/2010/main">
                 <a:solidFill>
                   <a:srgbClr val="FFFFFF"/>
@@ -17809,14 +18450,14 @@
           </a:ln>
           <a:effectLst/>
           <a:extLst>
-            <a:ext uri="{909E8E84-426E-40DD-AFC4-6F175D3DCCD1}">
+            <a:ext uri="{909E8E84-426E-40dd-AFC4-6F175D3DCCD1}">
               <a14:hiddenFill xmlns:a14="http://schemas.microsoft.com/office/drawing/2010/main">
                 <a:solidFill>
                   <a:schemeClr val="accent1"/>
                 </a:solidFill>
               </a14:hiddenFill>
             </a:ext>
-            <a:ext uri="{91240B29-F687-4F45-9708-019B960494DF}">
+            <a:ext uri="{91240B29-F687-4f45-9708-019B960494DF}">
               <a14:hiddenLine xmlns:a14="http://schemas.microsoft.com/office/drawing/2010/main" w="9525">
                 <a:solidFill>
                   <a:schemeClr val="tx1"/>
@@ -17826,7 +18467,7 @@
                 <a:tailEnd/>
               </a14:hiddenLine>
             </a:ext>
-            <a:ext uri="{AF507438-7753-43E0-B8FC-AC1667EBCBE1}">
+            <a:ext uri="{AF507438-7753-43e0-B8FC-AC1667EBCBE1}">
               <a14:hiddenEffects xmlns:a14="http://schemas.microsoft.com/office/drawing/2010/main">
                 <a:effectLst>
                   <a:outerShdw blurRad="63500" dist="38099" dir="2700000" algn="ctr" rotWithShape="0">
@@ -17961,14 +18602,14 @@
           </a:ln>
           <a:effectLst/>
           <a:extLst>
-            <a:ext uri="{909E8E84-426E-40DD-AFC4-6F175D3DCCD1}">
+            <a:ext uri="{909E8E84-426E-40dd-AFC4-6F175D3DCCD1}">
               <a14:hiddenFill xmlns:a14="http://schemas.microsoft.com/office/drawing/2010/main">
                 <a:solidFill>
                   <a:schemeClr val="accent1"/>
                 </a:solidFill>
               </a14:hiddenFill>
             </a:ext>
-            <a:ext uri="{91240B29-F687-4F45-9708-019B960494DF}">
+            <a:ext uri="{91240B29-F687-4f45-9708-019B960494DF}">
               <a14:hiddenLine xmlns:a14="http://schemas.microsoft.com/office/drawing/2010/main" w="9525">
                 <a:solidFill>
                   <a:schemeClr val="tx1"/>
@@ -17978,7 +18619,7 @@
                 <a:tailEnd/>
               </a14:hiddenLine>
             </a:ext>
-            <a:ext uri="{AF507438-7753-43E0-B8FC-AC1667EBCBE1}">
+            <a:ext uri="{AF507438-7753-43e0-B8FC-AC1667EBCBE1}">
               <a14:hiddenEffects xmlns:a14="http://schemas.microsoft.com/office/drawing/2010/main">
                 <a:effectLst>
                   <a:outerShdw blurRad="63500" dist="38099" dir="2700000" algn="ctr" rotWithShape="0">
@@ -18033,7 +18674,7 @@
   <p:timing>
     <p:tnLst>
       <p:par>
-        <p:cTn id="1" dur="indefinite" restart="never" nodeType="tmRoot"/>
+        <p:cTn xmlns:p14="http://schemas.microsoft.com/office/powerpoint/2010/main" id="1" dur="indefinite" restart="never" nodeType="tmRoot"/>
       </p:par>
     </p:tnLst>
   </p:timing>
@@ -18775,13 +19416,13 @@
   <p:clrMapOvr>
     <a:masterClrMapping/>
   </p:clrMapOvr>
-  <p:transition spd="slow">
+  <p:transition xmlns:p14="http://schemas.microsoft.com/office/powerpoint/2010/main" spd="slow">
     <p:cut/>
   </p:transition>
   <p:timing>
     <p:tnLst>
       <p:par>
-        <p:cTn id="1" dur="indefinite" restart="never" nodeType="tmRoot"/>
+        <p:cTn xmlns:p14="http://schemas.microsoft.com/office/powerpoint/2010/main" id="1" dur="indefinite" restart="never" nodeType="tmRoot"/>
       </p:par>
     </p:tnLst>
   </p:timing>
@@ -18864,7 +19505,7 @@
   <p:timing>
     <p:tnLst>
       <p:par>
-        <p:cTn id="1" dur="indefinite" restart="never" nodeType="tmRoot"/>
+        <p:cTn xmlns:p14="http://schemas.microsoft.com/office/powerpoint/2010/main" id="1" dur="indefinite" restart="never" nodeType="tmRoot"/>
       </p:par>
     </p:tnLst>
   </p:timing>
@@ -18943,7 +19584,7 @@
   <p:timing>
     <p:tnLst>
       <p:par>
-        <p:cTn id="1" dur="indefinite" restart="never" nodeType="tmRoot"/>
+        <p:cTn xmlns:p14="http://schemas.microsoft.com/office/powerpoint/2010/main" id="1" dur="indefinite" restart="never" nodeType="tmRoot"/>
       </p:par>
     </p:tnLst>
   </p:timing>
@@ -19143,7 +19784,7 @@
   <p:timing>
     <p:tnLst>
       <p:par>
-        <p:cTn id="1" dur="indefinite" restart="never" nodeType="tmRoot"/>
+        <p:cTn xmlns:p14="http://schemas.microsoft.com/office/powerpoint/2010/main" id="1" dur="indefinite" restart="never" nodeType="tmRoot"/>
       </p:par>
     </p:tnLst>
   </p:timing>
@@ -19337,7 +19978,7 @@
   <p:timing>
     <p:tnLst>
       <p:par>
-        <p:cTn id="1" dur="indefinite" restart="never" nodeType="tmRoot"/>
+        <p:cTn xmlns:p14="http://schemas.microsoft.com/office/powerpoint/2010/main" id="1" dur="indefinite" restart="never" nodeType="tmRoot"/>
       </p:par>
     </p:tnLst>
   </p:timing>
@@ -19516,7 +20157,7 @@
   <p:timing>
     <p:tnLst>
       <p:par>
-        <p:cTn id="1" dur="indefinite" restart="never" nodeType="tmRoot"/>
+        <p:cTn xmlns:p14="http://schemas.microsoft.com/office/powerpoint/2010/main" id="1" dur="indefinite" restart="never" nodeType="tmRoot"/>
       </p:par>
     </p:tnLst>
   </p:timing>
@@ -19807,7 +20448,7 @@
   <p:timing>
     <p:tnLst>
       <p:par>
-        <p:cTn id="1" dur="indefinite" restart="never" nodeType="tmRoot"/>
+        <p:cTn xmlns:p14="http://schemas.microsoft.com/office/powerpoint/2010/main" id="1" dur="indefinite" restart="never" nodeType="tmRoot"/>
       </p:par>
     </p:tnLst>
   </p:timing>
@@ -19875,7 +20516,7 @@
               <a:buNone/>
             </a:pPr>
             <a:r>
-              <a:rPr lang="en-US" sz="2400" dirty="0" smtClean="0"/>
+              <a:rPr lang="en-US" sz="1800" i="1" dirty="0" smtClean="0"/>
               <a:t>Re-act the scene with some of these assumptions.</a:t>
             </a:r>
           </a:p>
@@ -19993,7 +20634,7 @@
   <p:timing>
     <p:tnLst>
       <p:par>
-        <p:cTn id="1" dur="indefinite" restart="never" nodeType="tmRoot"/>
+        <p:cTn xmlns:p14="http://schemas.microsoft.com/office/powerpoint/2010/main" id="1" dur="indefinite" restart="never" nodeType="tmRoot"/>
       </p:par>
     </p:tnLst>
   </p:timing>
@@ -20122,14 +20763,14 @@
           </a:ln>
           <a:effectLst/>
           <a:extLst>
-            <a:ext uri="{909E8E84-426E-40DD-AFC4-6F175D3DCCD1}">
+            <a:ext uri="{909E8E84-426E-40dd-AFC4-6F175D3DCCD1}">
               <a14:hiddenFill xmlns:a14="http://schemas.microsoft.com/office/drawing/2010/main">
                 <a:solidFill>
                   <a:schemeClr val="accent1"/>
                 </a:solidFill>
               </a14:hiddenFill>
             </a:ext>
-            <a:ext uri="{91240B29-F687-4F45-9708-019B960494DF}">
+            <a:ext uri="{91240B29-F687-4f45-9708-019B960494DF}">
               <a14:hiddenLine xmlns:a14="http://schemas.microsoft.com/office/drawing/2010/main" w="9525">
                 <a:solidFill>
                   <a:schemeClr val="tx1"/>
@@ -20139,7 +20780,7 @@
                 <a:tailEnd/>
               </a14:hiddenLine>
             </a:ext>
-            <a:ext uri="{AF507438-7753-43E0-B8FC-AC1667EBCBE1}">
+            <a:ext uri="{AF507438-7753-43e0-B8FC-AC1667EBCBE1}">
               <a14:hiddenEffects xmlns:a14="http://schemas.microsoft.com/office/drawing/2010/main">
                 <a:effectLst>
                   <a:outerShdw blurRad="63500" dist="38099" dir="2700000" algn="ctr" rotWithShape="0">
@@ -20199,14 +20840,14 @@
           </a:ln>
           <a:effectLst/>
           <a:extLst>
-            <a:ext uri="{909E8E84-426E-40DD-AFC4-6F175D3DCCD1}">
+            <a:ext uri="{909E8E84-426E-40dd-AFC4-6F175D3DCCD1}">
               <a14:hiddenFill xmlns:a14="http://schemas.microsoft.com/office/drawing/2010/main">
                 <a:solidFill>
                   <a:schemeClr val="accent1"/>
                 </a:solidFill>
               </a14:hiddenFill>
             </a:ext>
-            <a:ext uri="{91240B29-F687-4F45-9708-019B960494DF}">
+            <a:ext uri="{91240B29-F687-4f45-9708-019B960494DF}">
               <a14:hiddenLine xmlns:a14="http://schemas.microsoft.com/office/drawing/2010/main" w="9525">
                 <a:solidFill>
                   <a:schemeClr val="tx1"/>
@@ -20216,7 +20857,7 @@
                 <a:tailEnd/>
               </a14:hiddenLine>
             </a:ext>
-            <a:ext uri="{AF507438-7753-43E0-B8FC-AC1667EBCBE1}">
+            <a:ext uri="{AF507438-7753-43e0-B8FC-AC1667EBCBE1}">
               <a14:hiddenEffects xmlns:a14="http://schemas.microsoft.com/office/drawing/2010/main">
                 <a:effectLst>
                   <a:outerShdw blurRad="63500" dist="38099" dir="2700000" algn="ctr" rotWithShape="0">
@@ -20345,14 +20986,14 @@
           </a:ln>
           <a:effectLst/>
           <a:extLst>
-            <a:ext uri="{909E8E84-426E-40DD-AFC4-6F175D3DCCD1}">
+            <a:ext uri="{909E8E84-426E-40dd-AFC4-6F175D3DCCD1}">
               <a14:hiddenFill xmlns:a14="http://schemas.microsoft.com/office/drawing/2010/main">
                 <a:solidFill>
                   <a:schemeClr val="accent1"/>
                 </a:solidFill>
               </a14:hiddenFill>
             </a:ext>
-            <a:ext uri="{91240B29-F687-4F45-9708-019B960494DF}">
+            <a:ext uri="{91240B29-F687-4f45-9708-019B960494DF}">
               <a14:hiddenLine xmlns:a14="http://schemas.microsoft.com/office/drawing/2010/main" w="9525">
                 <a:solidFill>
                   <a:schemeClr val="tx1"/>
@@ -20362,7 +21003,7 @@
                 <a:tailEnd/>
               </a14:hiddenLine>
             </a:ext>
-            <a:ext uri="{AF507438-7753-43E0-B8FC-AC1667EBCBE1}">
+            <a:ext uri="{AF507438-7753-43e0-B8FC-AC1667EBCBE1}">
               <a14:hiddenEffects xmlns:a14="http://schemas.microsoft.com/office/drawing/2010/main">
                 <a:effectLst>
                   <a:outerShdw blurRad="63500" dist="38099" dir="2700000" algn="ctr" rotWithShape="0">
@@ -20626,7 +21267,7 @@
             <a:tailEnd/>
           </a:ln>
           <a:extLst>
-            <a:ext uri="{909E8E84-426E-40DD-AFC4-6F175D3DCCD1}">
+            <a:ext uri="{909E8E84-426E-40dd-AFC4-6F175D3DCCD1}">
               <a14:hiddenFill xmlns:a14="http://schemas.microsoft.com/office/drawing/2010/main">
                 <a:solidFill>
                   <a:srgbClr val="FFFFFF"/>
@@ -20658,14 +21299,14 @@
           </a:ln>
           <a:effectLst/>
           <a:extLst>
-            <a:ext uri="{909E8E84-426E-40DD-AFC4-6F175D3DCCD1}">
+            <a:ext uri="{909E8E84-426E-40dd-AFC4-6F175D3DCCD1}">
               <a14:hiddenFill xmlns:a14="http://schemas.microsoft.com/office/drawing/2010/main">
                 <a:solidFill>
                   <a:schemeClr val="accent1"/>
                 </a:solidFill>
               </a14:hiddenFill>
             </a:ext>
-            <a:ext uri="{91240B29-F687-4F45-9708-019B960494DF}">
+            <a:ext uri="{91240B29-F687-4f45-9708-019B960494DF}">
               <a14:hiddenLine xmlns:a14="http://schemas.microsoft.com/office/drawing/2010/main" w="9525">
                 <a:solidFill>
                   <a:schemeClr val="tx1"/>
@@ -20675,7 +21316,7 @@
                 <a:tailEnd/>
               </a14:hiddenLine>
             </a:ext>
-            <a:ext uri="{AF507438-7753-43E0-B8FC-AC1667EBCBE1}">
+            <a:ext uri="{AF507438-7753-43e0-B8FC-AC1667EBCBE1}">
               <a14:hiddenEffects xmlns:a14="http://schemas.microsoft.com/office/drawing/2010/main">
                 <a:effectLst>
                   <a:outerShdw blurRad="63500" dist="38099" dir="2700000" algn="ctr" rotWithShape="0">
@@ -20810,14 +21451,14 @@
           </a:ln>
           <a:effectLst/>
           <a:extLst>
-            <a:ext uri="{909E8E84-426E-40DD-AFC4-6F175D3DCCD1}">
+            <a:ext uri="{909E8E84-426E-40dd-AFC4-6F175D3DCCD1}">
               <a14:hiddenFill xmlns:a14="http://schemas.microsoft.com/office/drawing/2010/main">
                 <a:solidFill>
                   <a:schemeClr val="accent1"/>
                 </a:solidFill>
               </a14:hiddenFill>
             </a:ext>
-            <a:ext uri="{91240B29-F687-4F45-9708-019B960494DF}">
+            <a:ext uri="{91240B29-F687-4f45-9708-019B960494DF}">
               <a14:hiddenLine xmlns:a14="http://schemas.microsoft.com/office/drawing/2010/main" w="9525">
                 <a:solidFill>
                   <a:schemeClr val="tx1"/>
@@ -20827,7 +21468,7 @@
                 <a:tailEnd/>
               </a14:hiddenLine>
             </a:ext>
-            <a:ext uri="{AF507438-7753-43E0-B8FC-AC1667EBCBE1}">
+            <a:ext uri="{AF507438-7753-43e0-B8FC-AC1667EBCBE1}">
               <a14:hiddenEffects xmlns:a14="http://schemas.microsoft.com/office/drawing/2010/main">
                 <a:effectLst>
                   <a:outerShdw blurRad="63500" dist="38099" dir="2700000" algn="ctr" rotWithShape="0">
@@ -20882,7 +21523,7 @@
   <p:timing>
     <p:tnLst>
       <p:par>
-        <p:cTn id="1" dur="indefinite" restart="never" nodeType="tmRoot"/>
+        <p:cTn xmlns:p14="http://schemas.microsoft.com/office/powerpoint/2010/main" id="1" dur="indefinite" restart="never" nodeType="tmRoot"/>
       </p:par>
     </p:tnLst>
   </p:timing>
@@ -20950,7 +21591,7 @@
               <a:buNone/>
             </a:pPr>
             <a:r>
-              <a:rPr lang="en-US" sz="2400" dirty="0" smtClean="0"/>
+              <a:rPr lang="en-US" sz="1800" i="1" dirty="0" smtClean="0"/>
               <a:t>Re-act the scene with some of these behaviours.</a:t>
             </a:r>
           </a:p>
@@ -20961,80 +21602,56 @@
             <a:endParaRPr lang="en-US" sz="2400" dirty="0"/>
           </a:p>
           <a:p>
-            <a:pPr marL="514350" indent="-514350" algn="just">
-              <a:buFont typeface="+mj-lt"/>
-              <a:buAutoNum type="romanLcPeriod"/>
-            </a:pPr>
+            <a:pPr algn="just"/>
             <a:r>
               <a:rPr lang="en-US" sz="2400" dirty="0" smtClean="0"/>
               <a:t>State views and ask genuine questions</a:t>
             </a:r>
           </a:p>
           <a:p>
-            <a:pPr marL="514350" indent="-514350" algn="just">
-              <a:buFont typeface="+mj-lt"/>
-              <a:buAutoNum type="romanLcPeriod"/>
-            </a:pPr>
+            <a:pPr algn="just"/>
             <a:r>
               <a:rPr lang="en-US" sz="2400" dirty="0" smtClean="0"/>
               <a:t>Share all relevant information</a:t>
             </a:r>
           </a:p>
           <a:p>
-            <a:pPr marL="514350" indent="-514350" algn="just">
-              <a:buFont typeface="+mj-lt"/>
-              <a:buAutoNum type="romanLcPeriod"/>
-            </a:pPr>
+            <a:pPr algn="just"/>
             <a:r>
               <a:rPr lang="en-US" sz="2400" dirty="0" smtClean="0"/>
               <a:t>Use specific examples and agree on what important words mean</a:t>
             </a:r>
           </a:p>
           <a:p>
-            <a:pPr marL="514350" indent="-514350" algn="just">
-              <a:buFont typeface="+mj-lt"/>
-              <a:buAutoNum type="romanLcPeriod"/>
-            </a:pPr>
+            <a:pPr algn="just"/>
             <a:r>
               <a:rPr lang="en-US" sz="2400" dirty="0" smtClean="0"/>
               <a:t>Explain reasoning and intent</a:t>
             </a:r>
           </a:p>
           <a:p>
-            <a:pPr marL="514350" indent="-514350" algn="just">
-              <a:buFont typeface="+mj-lt"/>
-              <a:buAutoNum type="romanLcPeriod"/>
-            </a:pPr>
+            <a:pPr algn="just"/>
             <a:r>
               <a:rPr lang="en-US" sz="2400" dirty="0" smtClean="0"/>
               <a:t>Focus on interests, not positions</a:t>
             </a:r>
           </a:p>
           <a:p>
-            <a:pPr marL="514350" indent="-514350" algn="just">
-              <a:buFont typeface="+mj-lt"/>
-              <a:buAutoNum type="romanLcPeriod"/>
-            </a:pPr>
+            <a:pPr algn="just"/>
             <a:r>
               <a:rPr lang="en-US" sz="2400" dirty="0" smtClean="0"/>
               <a:t>Test assumptions and inferences</a:t>
             </a:r>
           </a:p>
           <a:p>
-            <a:pPr marL="514350" indent="-514350" algn="just">
-              <a:buFont typeface="+mj-lt"/>
-              <a:buAutoNum type="romanLcPeriod"/>
-            </a:pPr>
+            <a:pPr algn="just"/>
             <a:r>
               <a:rPr lang="en-US" sz="2400" dirty="0" smtClean="0"/>
               <a:t>Jointly design next steps</a:t>
             </a:r>
           </a:p>
           <a:p>
-            <a:pPr marL="514350" indent="-514350" algn="just">
-              <a:buFont typeface="+mj-lt"/>
-              <a:buAutoNum type="romanLcPeriod"/>
-            </a:pPr>
+            <a:pPr algn="just"/>
             <a:r>
               <a:rPr lang="en-US" sz="2400" dirty="0" smtClean="0"/>
               <a:t>Discuss undiscussable issues</a:t>
@@ -21098,7 +21715,7 @@
   <p:timing>
     <p:tnLst>
       <p:par>
-        <p:cTn id="1" dur="indefinite" restart="never" nodeType="tmRoot"/>
+        <p:cTn xmlns:p14="http://schemas.microsoft.com/office/powerpoint/2010/main" id="1" dur="indefinite" restart="never" nodeType="tmRoot"/>
       </p:par>
     </p:tnLst>
   </p:timing>
@@ -21177,7 +21794,7 @@
   <p:timing>
     <p:tnLst>
       <p:par>
-        <p:cTn id="1" dur="indefinite" restart="never" nodeType="tmRoot"/>
+        <p:cTn xmlns:p14="http://schemas.microsoft.com/office/powerpoint/2010/main" id="1" dur="indefinite" restart="never" nodeType="tmRoot"/>
       </p:par>
     </p:tnLst>
   </p:timing>
@@ -21245,7 +21862,7 @@
               <a:buNone/>
             </a:pPr>
             <a:r>
-              <a:rPr lang="en-US" sz="2400" dirty="0" smtClean="0"/>
+              <a:rPr lang="en-US" sz="1800" i="1" dirty="0" smtClean="0"/>
               <a:t>Keep a tally of each behaviour each time you see it.</a:t>
             </a:r>
           </a:p>
@@ -21260,7 +21877,7 @@
               <a:buNone/>
             </a:pPr>
             <a:r>
-              <a:rPr lang="en-US" sz="1800" dirty="0" smtClean="0"/>
+              <a:rPr lang="en-US" sz="1900" dirty="0" smtClean="0"/>
               <a:t>___ State my views without asking for others’ views and vice versa</a:t>
             </a:r>
           </a:p>
@@ -21269,16 +21886,8 @@
               <a:buNone/>
             </a:pPr>
             <a:r>
-              <a:rPr lang="en-US" sz="1800" dirty="0" smtClean="0"/>
-              <a:t>___ </a:t>
-            </a:r>
-            <a:r>
-              <a:rPr lang="en-US" sz="1800" dirty="0" smtClean="0"/>
-              <a:t>Withhold </a:t>
-            </a:r>
-            <a:r>
-              <a:rPr lang="en-US" sz="1800" dirty="0" smtClean="0"/>
-              <a:t>relevant information</a:t>
+              <a:rPr lang="en-US" sz="1900" dirty="0" smtClean="0"/>
+              <a:t>___ Withhold relevant information</a:t>
             </a:r>
           </a:p>
           <a:p>
@@ -21286,7 +21895,7 @@
               <a:buNone/>
             </a:pPr>
             <a:r>
-              <a:rPr lang="en-US" sz="1800" dirty="0" smtClean="0"/>
+              <a:rPr lang="en-US" sz="1900" dirty="0" smtClean="0"/>
               <a:t>___ Speak in general terms and don’t agree on what important words mean</a:t>
             </a:r>
           </a:p>
@@ -21295,7 +21904,7 @@
               <a:buNone/>
             </a:pPr>
             <a:r>
-              <a:rPr lang="en-US" sz="1800" dirty="0" smtClean="0"/>
+              <a:rPr lang="en-US" sz="1900" dirty="0" smtClean="0"/>
               <a:t>___ Keep my reasoning private; don’t ask others about their reasoning</a:t>
             </a:r>
           </a:p>
@@ -21304,7 +21913,7 @@
               <a:buNone/>
             </a:pPr>
             <a:r>
-              <a:rPr lang="en-US" sz="1800" dirty="0" smtClean="0"/>
+              <a:rPr lang="en-US" sz="1900" dirty="0" smtClean="0"/>
               <a:t>___ Focus on positions, not interests</a:t>
             </a:r>
           </a:p>
@@ -21313,7 +21922,7 @@
               <a:buNone/>
             </a:pPr>
             <a:r>
-              <a:rPr lang="en-US" sz="1800" dirty="0" smtClean="0"/>
+              <a:rPr lang="en-US" sz="1900" dirty="0" smtClean="0"/>
               <a:t>___ Act on untested assumptions and inference as if they were true</a:t>
             </a:r>
           </a:p>
@@ -21322,7 +21931,7 @@
               <a:buNone/>
             </a:pPr>
             <a:r>
-              <a:rPr lang="en-US" sz="1800" dirty="0" smtClean="0"/>
+              <a:rPr lang="en-US" sz="1900" dirty="0" smtClean="0"/>
               <a:t>___ Control the conversation</a:t>
             </a:r>
           </a:p>
@@ -21331,8 +21940,12 @@
               <a:buNone/>
             </a:pPr>
             <a:r>
+              <a:rPr lang="en-US" sz="1900" dirty="0" smtClean="0"/>
+              <a:t>___ Avoid, ease into, or save face on difficult issu</a:t>
+            </a:r>
+            <a:r>
               <a:rPr lang="en-US" sz="1800" dirty="0" smtClean="0"/>
-              <a:t>___ Avoid, ease into, or save face on difficult issues</a:t>
+              <a:t>es</a:t>
             </a:r>
             <a:endParaRPr lang="en-US" sz="1800" dirty="0"/>
           </a:p>
@@ -21382,7 +21995,7 @@
   <p:timing>
     <p:tnLst>
       <p:par>
-        <p:cTn id="1" dur="indefinite" restart="never" nodeType="tmRoot"/>
+        <p:cTn xmlns:p14="http://schemas.microsoft.com/office/powerpoint/2010/main" id="1" dur="indefinite" restart="never" nodeType="tmRoot"/>
       </p:par>
     </p:tnLst>
   </p:timing>
@@ -21450,7 +22063,7 @@
               <a:buNone/>
             </a:pPr>
             <a:r>
-              <a:rPr lang="en-US" sz="2400" dirty="0"/>
+              <a:rPr lang="en-US" sz="1800" i="1" dirty="0"/>
               <a:t>Keep a tally of each behaviour each time you see it.</a:t>
             </a:r>
           </a:p>
@@ -21465,7 +22078,7 @@
               <a:buNone/>
             </a:pPr>
             <a:r>
-              <a:rPr lang="en-US" sz="1800" dirty="0" smtClean="0"/>
+              <a:rPr lang="en-US" sz="1900" dirty="0" smtClean="0"/>
               <a:t>___ State views and ask genuine questions</a:t>
             </a:r>
           </a:p>
@@ -21474,7 +22087,7 @@
               <a:buNone/>
             </a:pPr>
             <a:r>
-              <a:rPr lang="en-US" sz="1800" dirty="0" smtClean="0"/>
+              <a:rPr lang="en-US" sz="1900" dirty="0" smtClean="0"/>
               <a:t>___ Share all relevant information</a:t>
             </a:r>
           </a:p>
@@ -21483,7 +22096,7 @@
               <a:buNone/>
             </a:pPr>
             <a:r>
-              <a:rPr lang="en-US" sz="1800" dirty="0" smtClean="0"/>
+              <a:rPr lang="en-US" sz="1900" dirty="0" smtClean="0"/>
               <a:t>___ Use specific examples and agree on what important words mean</a:t>
             </a:r>
           </a:p>
@@ -21492,7 +22105,7 @@
               <a:buNone/>
             </a:pPr>
             <a:r>
-              <a:rPr lang="en-US" sz="1800" dirty="0" smtClean="0"/>
+              <a:rPr lang="en-US" sz="1900" dirty="0" smtClean="0"/>
               <a:t>___ Explain reasoning and intent</a:t>
             </a:r>
           </a:p>
@@ -21501,7 +22114,7 @@
               <a:buNone/>
             </a:pPr>
             <a:r>
-              <a:rPr lang="en-US" sz="1800" dirty="0" smtClean="0"/>
+              <a:rPr lang="en-US" sz="1900" dirty="0" smtClean="0"/>
               <a:t>___ Focus on interests, not positions</a:t>
             </a:r>
           </a:p>
@@ -21510,7 +22123,7 @@
               <a:buNone/>
             </a:pPr>
             <a:r>
-              <a:rPr lang="en-US" sz="1800" dirty="0" smtClean="0"/>
+              <a:rPr lang="en-US" sz="1900" dirty="0" smtClean="0"/>
               <a:t>___ Test assumptions and inferences</a:t>
             </a:r>
           </a:p>
@@ -21519,7 +22132,7 @@
               <a:buNone/>
             </a:pPr>
             <a:r>
-              <a:rPr lang="en-US" sz="1800" dirty="0" smtClean="0"/>
+              <a:rPr lang="en-US" sz="1900" dirty="0" smtClean="0"/>
               <a:t>___ Jointly design next steps</a:t>
             </a:r>
           </a:p>
@@ -21528,7 +22141,7 @@
               <a:buNone/>
             </a:pPr>
             <a:r>
-              <a:rPr lang="en-US" sz="1800" dirty="0" smtClean="0"/>
+              <a:rPr lang="en-US" sz="1900" dirty="0" smtClean="0"/>
               <a:t>___ Discuss undiscussable issues</a:t>
             </a:r>
           </a:p>
@@ -21590,7 +22203,7 @@
   <p:timing>
     <p:tnLst>
       <p:par>
-        <p:cTn id="1" dur="indefinite" restart="never" nodeType="tmRoot"/>
+        <p:cTn xmlns:p14="http://schemas.microsoft.com/office/powerpoint/2010/main" id="1" dur="indefinite" restart="never" nodeType="tmRoot"/>
       </p:par>
     </p:tnLst>
   </p:timing>
@@ -21756,7 +22369,7 @@
   <p:timing>
     <p:tnLst>
       <p:par>
-        <p:cTn id="1" dur="indefinite" restart="never" nodeType="tmRoot"/>
+        <p:cTn xmlns:p14="http://schemas.microsoft.com/office/powerpoint/2010/main" id="1" dur="indefinite" restart="never" nodeType="tmRoot"/>
       </p:par>
     </p:tnLst>
   </p:timing>
@@ -21799,15 +22412,7 @@
           <a:p>
             <a:r>
               <a:rPr lang="en-US" sz="3600" dirty="0" smtClean="0"/>
-              <a:t>The </a:t>
-            </a:r>
-            <a:r>
-              <a:rPr lang="en-US" sz="3600" dirty="0" smtClean="0"/>
-              <a:t>Espoused Mindset </a:t>
-            </a:r>
-            <a:r>
-              <a:rPr lang="en-US" sz="3600" dirty="0" smtClean="0"/>
-              <a:t>Questionnaire</a:t>
+              <a:t>The Espoused Mindset Questionnaire</a:t>
             </a:r>
             <a:endParaRPr lang="en-US" sz="3600" dirty="0"/>
           </a:p>
@@ -21825,8 +22430,8 @@
         </p:nvSpPr>
         <p:spPr>
           <a:xfrm>
-            <a:off x="251520" y="1196752"/>
-            <a:ext cx="8640960" cy="792088"/>
+            <a:off x="323528" y="1268760"/>
+            <a:ext cx="8640960" cy="648072"/>
           </a:xfrm>
         </p:spPr>
         <p:txBody>
@@ -21835,40 +22440,59 @@
           </a:bodyPr>
           <a:lstStyle/>
           <a:p>
-            <a:pPr marL="0" indent="0" algn="ctr">
+            <a:pPr marL="0" indent="0">
               <a:buNone/>
             </a:pPr>
             <a:r>
-              <a:rPr lang="en-US" sz="1400" dirty="0" smtClean="0"/>
-              <a:t>Read each pair of statements. For each pair, tick the box which most accurately reflects the way you think</a:t>
-            </a:r>
-            <a:r>
-              <a:rPr lang="en-US" sz="1400" dirty="0" smtClean="0"/>
-              <a:t>.</a:t>
-            </a:r>
-          </a:p>
-          <a:p>
-            <a:pPr marL="0" indent="0" algn="ctr">
+              <a:rPr lang="en-US" sz="1250" i="1" dirty="0" smtClean="0">
+                <a:latin typeface="+mn-lt"/>
+              </a:rPr>
+              <a:t>Read each pair of statements. For each pair, tick the box which most accurately reflects the way you think.</a:t>
+            </a:r>
+          </a:p>
+          <a:p>
+            <a:pPr marL="0" indent="0">
               <a:buNone/>
             </a:pPr>
             <a:r>
-              <a:rPr lang="en-US" sz="1400" dirty="0" smtClean="0"/>
-              <a:t>Tick "1" if you fully agree with the statement on the left</a:t>
-            </a:r>
-          </a:p>
-          <a:p>
-            <a:pPr marL="0" indent="0" algn="ctr">
-              <a:buNone/>
-            </a:pPr>
-            <a:r>
-              <a:rPr lang="en-US" sz="1400" dirty="0"/>
-              <a:t>T</a:t>
-            </a:r>
-            <a:r>
-              <a:rPr lang="en-US" sz="1400" dirty="0" smtClean="0"/>
-              <a:t>ick "4" if you fully agree with the statement on the right</a:t>
-            </a:r>
-            <a:endParaRPr lang="en-US" sz="1400" dirty="0"/>
+              <a:rPr lang="en-US" sz="1250" i="1" dirty="0" smtClean="0">
+                <a:latin typeface="+mn-lt"/>
+              </a:rPr>
+              <a:t>For instance, t</a:t>
+            </a:r>
+            <a:r>
+              <a:rPr lang="en-US" sz="1250" i="1" dirty="0" smtClean="0">
+                <a:latin typeface="+mn-lt"/>
+              </a:rPr>
+              <a:t>ick </a:t>
+            </a:r>
+            <a:r>
+              <a:rPr lang="en-US" sz="1250" i="1" dirty="0" smtClean="0">
+                <a:latin typeface="+mn-lt"/>
+              </a:rPr>
+              <a:t>"1" if you fully agree with the statement on the </a:t>
+            </a:r>
+            <a:r>
+              <a:rPr lang="en-US" sz="1250" i="1" dirty="0" smtClean="0">
+                <a:latin typeface="+mn-lt"/>
+              </a:rPr>
+              <a:t>left or tick </a:t>
+            </a:r>
+            <a:r>
+              <a:rPr lang="en-US" sz="1250" i="1" dirty="0" smtClean="0">
+                <a:latin typeface="+mn-lt"/>
+              </a:rPr>
+              <a:t>"4" if you fully agree with the statement on the </a:t>
+            </a:r>
+            <a:r>
+              <a:rPr lang="en-US" sz="1250" i="1" dirty="0" smtClean="0">
+                <a:latin typeface="+mn-lt"/>
+              </a:rPr>
+              <a:t>right.</a:t>
+            </a:r>
+            <a:endParaRPr lang="en-US" sz="1250" i="1" dirty="0">
+              <a:latin typeface="+mn-lt"/>
+            </a:endParaRPr>
           </a:p>
         </p:txBody>
       </p:sp>
@@ -21931,13 +22555,13 @@
           <p:nvPr>
             <p:extLst>
               <p:ext uri="{D42A27DB-BD31-4B8C-83A1-F6EECF244321}">
-                <p14:modId xmlns:p14="http://schemas.microsoft.com/office/powerpoint/2010/main" val="1880011261"/>
+                <p14:modId xmlns:p14="http://schemas.microsoft.com/office/powerpoint/2010/main" val="1464269839"/>
               </p:ext>
             </p:extLst>
           </p:nvPr>
         </p:nvGraphicFramePr>
         <p:xfrm>
-          <a:off x="395536" y="2001376"/>
+          <a:off x="395536" y="2145391"/>
           <a:ext cx="8424936" cy="3803888"/>
         </p:xfrm>
         <a:graphic>
@@ -22143,11 +22767,7 @@
                       <a:pPr algn="l"/>
                       <a:r>
                         <a:rPr lang="en-US" sz="1600" dirty="0" smtClean="0"/>
-                        <a:t>2) </a:t>
-                      </a:r>
-                      <a:r>
-                        <a:rPr lang="en-US" sz="1600" dirty="0" smtClean="0"/>
-                        <a:t>People who disagree with me are pushing an agenda</a:t>
+                        <a:t>2) People who disagree with me are pushing an agenda</a:t>
                       </a:r>
                       <a:endParaRPr lang="en-US" sz="1600" dirty="0"/>
                     </a:p>
@@ -22223,11 +22843,7 @@
                       <a:pPr algn="l"/>
                       <a:r>
                         <a:rPr lang="en-US" sz="1600" dirty="0" smtClean="0"/>
-                        <a:t>3</a:t>
-                      </a:r>
-                      <a:r>
-                        <a:rPr lang="en-US" sz="1600" dirty="0" smtClean="0"/>
-                        <a:t>) I am right most of the time</a:t>
+                        <a:t>3) I am right most of the time</a:t>
                       </a:r>
                     </a:p>
                     <a:p>
@@ -22289,11 +22905,7 @@
                       <a:pPr algn="l"/>
                       <a:r>
                         <a:rPr lang="en-US" sz="1600" dirty="0" smtClean="0"/>
-                        <a:t>3) </a:t>
-                      </a:r>
-                      <a:r>
-                        <a:rPr lang="en-US" sz="1600" dirty="0" smtClean="0"/>
-                        <a:t>I am often mistaken or have</a:t>
+                        <a:t>3) I am often mistaken or have</a:t>
                       </a:r>
                       <a:r>
                         <a:rPr lang="en-US" sz="1600" baseline="0" dirty="0" smtClean="0"/>
@@ -22314,11 +22926,7 @@
                       <a:pPr algn="l"/>
                       <a:r>
                         <a:rPr lang="en-US" sz="1600" dirty="0" smtClean="0"/>
-                        <a:t>4) </a:t>
-                      </a:r>
-                      <a:r>
-                        <a:rPr lang="en-US" sz="1600" dirty="0" smtClean="0"/>
-                        <a:t>I don't have much to learn from my colleagues</a:t>
+                        <a:t>4) I don't have much to learn from my colleagues</a:t>
                       </a:r>
                       <a:endParaRPr lang="en-US" sz="1600" dirty="0"/>
                     </a:p>
@@ -22465,23 +23073,11 @@
                       </a:r>
                       <a:r>
                         <a:rPr lang="en-US" sz="1600" dirty="0" smtClean="0"/>
-                        <a:t>My feelings are </a:t>
-                      </a:r>
-                      <a:r>
-                        <a:rPr lang="en-US" sz="1600" dirty="0" smtClean="0"/>
-                        <a:t>not obvious to others </a:t>
+                        <a:t>My feelings are not obvious to others </a:t>
                       </a:r>
                       <a:r>
                         <a:rPr lang="en-US" sz="1600" baseline="0" dirty="0" smtClean="0"/>
-                        <a:t>and </a:t>
-                      </a:r>
-                      <a:r>
-                        <a:rPr lang="en-US" sz="1600" baseline="0" dirty="0" smtClean="0"/>
-                        <a:t>may </a:t>
-                      </a:r>
-                      <a:r>
-                        <a:rPr lang="en-US" sz="1600" baseline="0" dirty="0" smtClean="0"/>
-                        <a:t>not be rational</a:t>
+                        <a:t>and may not be rational</a:t>
                       </a:r>
                       <a:endParaRPr lang="en-US" sz="1600" dirty="0"/>
                     </a:p>
@@ -22577,7 +23173,7 @@
         </p:nvCxnSpPr>
         <p:spPr>
           <a:xfrm>
-            <a:off x="4139952" y="1988840"/>
+            <a:off x="4139952" y="2132855"/>
             <a:ext cx="0" cy="3960440"/>
           </a:xfrm>
           <a:prstGeom prst="line">
@@ -22613,7 +23209,7 @@
         </p:nvCxnSpPr>
         <p:spPr>
           <a:xfrm>
-            <a:off x="4572000" y="1988840"/>
+            <a:off x="4572000" y="2132855"/>
             <a:ext cx="0" cy="3960440"/>
           </a:xfrm>
           <a:prstGeom prst="line">
@@ -22649,7 +23245,7 @@
         </p:nvCxnSpPr>
         <p:spPr>
           <a:xfrm>
-            <a:off x="5004048" y="1988840"/>
+            <a:off x="5004048" y="2132855"/>
             <a:ext cx="0" cy="3960440"/>
           </a:xfrm>
           <a:prstGeom prst="line">
@@ -22685,7 +23281,7 @@
         </p:nvCxnSpPr>
         <p:spPr>
           <a:xfrm>
-            <a:off x="3707904" y="1988840"/>
+            <a:off x="3707904" y="2132855"/>
             <a:ext cx="0" cy="3960440"/>
           </a:xfrm>
           <a:prstGeom prst="line">
@@ -22721,7 +23317,7 @@
         </p:nvCxnSpPr>
         <p:spPr>
           <a:xfrm>
-            <a:off x="5436096" y="1988840"/>
+            <a:off x="5436096" y="2132855"/>
             <a:ext cx="0" cy="3960440"/>
           </a:xfrm>
           <a:prstGeom prst="line">
@@ -22757,7 +23353,7 @@
         </p:nvCxnSpPr>
         <p:spPr>
           <a:xfrm flipH="1">
-            <a:off x="336228" y="3107060"/>
+            <a:off x="336228" y="3251075"/>
             <a:ext cx="8424936" cy="1"/>
           </a:xfrm>
           <a:prstGeom prst="line">
@@ -22793,7 +23389,7 @@
         </p:nvCxnSpPr>
         <p:spPr>
           <a:xfrm flipH="1">
-            <a:off x="323528" y="3755131"/>
+            <a:off x="323528" y="3899146"/>
             <a:ext cx="8424936" cy="1"/>
           </a:xfrm>
           <a:prstGeom prst="line">
@@ -22829,7 +23425,7 @@
         </p:nvCxnSpPr>
         <p:spPr>
           <a:xfrm flipH="1">
-            <a:off x="323528" y="4352403"/>
+            <a:off x="323528" y="4496418"/>
             <a:ext cx="8424936" cy="1"/>
           </a:xfrm>
           <a:prstGeom prst="line">
@@ -22865,7 +23461,7 @@
         </p:nvCxnSpPr>
         <p:spPr>
           <a:xfrm flipH="1">
-            <a:off x="323528" y="4907260"/>
+            <a:off x="323528" y="5051275"/>
             <a:ext cx="8424936" cy="1"/>
           </a:xfrm>
           <a:prstGeom prst="line">
@@ -22901,7 +23497,7 @@
         </p:nvCxnSpPr>
         <p:spPr>
           <a:xfrm flipH="1">
-            <a:off x="323528" y="5491831"/>
+            <a:off x="323528" y="5635846"/>
             <a:ext cx="8424936" cy="1"/>
           </a:xfrm>
           <a:prstGeom prst="line">
@@ -22937,7 +23533,7 @@
         </p:nvCxnSpPr>
         <p:spPr>
           <a:xfrm flipH="1">
-            <a:off x="3707904" y="1988840"/>
+            <a:off x="3707904" y="2132855"/>
             <a:ext cx="1728192" cy="0"/>
           </a:xfrm>
           <a:prstGeom prst="line">
@@ -22973,7 +23569,7 @@
         </p:nvCxnSpPr>
         <p:spPr>
           <a:xfrm flipH="1">
-            <a:off x="323528" y="2420888"/>
+            <a:off x="323528" y="2564903"/>
             <a:ext cx="8424936" cy="1"/>
           </a:xfrm>
           <a:prstGeom prst="line">
@@ -23009,7 +23605,7 @@
         </p:nvCxnSpPr>
         <p:spPr>
           <a:xfrm flipH="1">
-            <a:off x="323528" y="5949280"/>
+            <a:off x="323528" y="6093295"/>
             <a:ext cx="8424936" cy="1"/>
           </a:xfrm>
           <a:prstGeom prst="line">
@@ -23050,7 +23646,7 @@
   <p:timing>
     <p:tnLst>
       <p:par>
-        <p:cTn id="1" dur="indefinite" restart="never" nodeType="tmRoot"/>
+        <p:cTn xmlns:p14="http://schemas.microsoft.com/office/powerpoint/2010/main" id="1" dur="indefinite" restart="never" nodeType="tmRoot"/>
       </p:par>
     </p:tnLst>
   </p:timing>
@@ -23418,7 +24014,7 @@
   <p:timing>
     <p:tnLst>
       <p:par>
-        <p:cTn id="1" dur="indefinite" restart="never" nodeType="tmRoot"/>
+        <p:cTn xmlns:p14="http://schemas.microsoft.com/office/powerpoint/2010/main" id="1" dur="indefinite" restart="never" nodeType="tmRoot"/>
       </p:par>
     </p:tnLst>
   </p:timing>
@@ -23526,7 +24122,7 @@
   <p:timing>
     <p:tnLst>
       <p:par>
-        <p:cTn id="1" dur="indefinite" restart="never" nodeType="tmRoot"/>
+        <p:cTn xmlns:p14="http://schemas.microsoft.com/office/powerpoint/2010/main" id="1" dur="indefinite" restart="never" nodeType="tmRoot"/>
       </p:par>
     </p:tnLst>
   </p:timing>
@@ -23643,7 +24239,7 @@
   <p:timing>
     <p:tnLst>
       <p:par>
-        <p:cTn id="1" dur="indefinite" restart="never" nodeType="tmRoot"/>
+        <p:cTn xmlns:p14="http://schemas.microsoft.com/office/powerpoint/2010/main" id="1" dur="indefinite" restart="never" nodeType="tmRoot"/>
       </p:par>
     </p:tnLst>
   </p:timing>
@@ -23737,7 +24333,7 @@
   <p:timing>
     <p:tnLst>
       <p:par>
-        <p:cTn id="1" dur="indefinite" restart="never" nodeType="tmRoot"/>
+        <p:cTn xmlns:p14="http://schemas.microsoft.com/office/powerpoint/2010/main" id="1" dur="indefinite" restart="never" nodeType="tmRoot"/>
       </p:par>
     </p:tnLst>
   </p:timing>

</xml_diff>

<commit_message>
Add mindset questionnaire to presentation
</commit_message>
<xml_diff>
--- a/The Fellowship of the Ring.pptx
+++ b/The Fellowship of the Ring.pptx
@@ -43,7 +43,7 @@
     <p:sldId id="286" r:id="rId34"/>
   </p:sldIdLst>
   <p:sldSz cx="9144000" cy="6858000" type="screen4x3"/>
-  <p:notesSz cx="6819900" cy="9918700"/>
+  <p:notesSz cx="7099300" cy="10234613"/>
   <p:defaultTextStyle>
     <a:defPPr>
       <a:defRPr lang="en-US"/>
@@ -177,14 +177,14 @@
         <p:spPr>
           <a:xfrm>
             <a:off x="0" y="1"/>
-            <a:ext cx="2955290" cy="495935"/>
+            <a:ext cx="3076363" cy="511731"/>
           </a:xfrm>
           <a:prstGeom prst="rect">
             <a:avLst/>
           </a:prstGeom>
         </p:spPr>
         <p:txBody>
-          <a:bodyPr vert="horz" lIns="91440" tIns="45720" rIns="91440" bIns="45720" rtlCol="0"/>
+          <a:bodyPr vert="horz" lIns="94686" tIns="47343" rIns="94686" bIns="47343" rtlCol="0"/>
           <a:lstStyle>
             <a:lvl1pPr algn="l">
               <a:defRPr sz="1200"/>
@@ -207,15 +207,15 @@
         </p:nvSpPr>
         <p:spPr>
           <a:xfrm>
-            <a:off x="3863032" y="1"/>
-            <a:ext cx="2955290" cy="495935"/>
+            <a:off x="4021294" y="1"/>
+            <a:ext cx="3076363" cy="511731"/>
           </a:xfrm>
           <a:prstGeom prst="rect">
             <a:avLst/>
           </a:prstGeom>
         </p:spPr>
         <p:txBody>
-          <a:bodyPr vert="horz" lIns="91440" tIns="45720" rIns="91440" bIns="45720" rtlCol="0"/>
+          <a:bodyPr vert="horz" lIns="94686" tIns="47343" rIns="94686" bIns="47343" rtlCol="0"/>
           <a:lstStyle>
             <a:lvl1pPr algn="r">
               <a:defRPr sz="1200"/>
@@ -242,8 +242,8 @@
         </p:nvSpPr>
         <p:spPr>
           <a:xfrm>
-            <a:off x="931863" y="742950"/>
-            <a:ext cx="4957762" cy="3719513"/>
+            <a:off x="990600" y="766763"/>
+            <a:ext cx="5119688" cy="3838575"/>
           </a:xfrm>
           <a:prstGeom prst="rect">
             <a:avLst/>
@@ -256,7 +256,7 @@
           </a:ln>
         </p:spPr>
         <p:txBody>
-          <a:bodyPr vert="horz" lIns="91440" tIns="45720" rIns="91440" bIns="45720" rtlCol="0" anchor="ctr"/>
+          <a:bodyPr vert="horz" lIns="94686" tIns="47343" rIns="94686" bIns="47343" rtlCol="0" anchor="ctr"/>
           <a:lstStyle/>
           <a:p>
             <a:endParaRPr lang="en-GB" dirty="0"/>
@@ -275,15 +275,15 @@
         </p:nvSpPr>
         <p:spPr>
           <a:xfrm>
-            <a:off x="681990" y="4711383"/>
-            <a:ext cx="5455920" cy="4463415"/>
+            <a:off x="709930" y="4861442"/>
+            <a:ext cx="5679440" cy="4605576"/>
           </a:xfrm>
           <a:prstGeom prst="rect">
             <a:avLst/>
           </a:prstGeom>
         </p:spPr>
         <p:txBody>
-          <a:bodyPr vert="horz" lIns="91440" tIns="45720" rIns="91440" bIns="45720" rtlCol="0"/>
+          <a:bodyPr vert="horz" lIns="94686" tIns="47343" rIns="94686" bIns="47343" rtlCol="0"/>
           <a:lstStyle/>
           <a:p>
             <a:pPr lvl="0"/>
@@ -335,15 +335,15 @@
         </p:nvSpPr>
         <p:spPr>
           <a:xfrm>
-            <a:off x="0" y="9421045"/>
-            <a:ext cx="2955290" cy="495935"/>
+            <a:off x="0" y="9721108"/>
+            <a:ext cx="3076363" cy="511731"/>
           </a:xfrm>
           <a:prstGeom prst="rect">
             <a:avLst/>
           </a:prstGeom>
         </p:spPr>
         <p:txBody>
-          <a:bodyPr vert="horz" lIns="91440" tIns="45720" rIns="91440" bIns="45720" rtlCol="0" anchor="b"/>
+          <a:bodyPr vert="horz" lIns="94686" tIns="47343" rIns="94686" bIns="47343" rtlCol="0" anchor="b"/>
           <a:lstStyle>
             <a:lvl1pPr algn="l">
               <a:defRPr sz="1200"/>
@@ -366,15 +366,15 @@
         </p:nvSpPr>
         <p:spPr>
           <a:xfrm>
-            <a:off x="3863032" y="9421045"/>
-            <a:ext cx="2955290" cy="495935"/>
+            <a:off x="4021294" y="9721108"/>
+            <a:ext cx="3076363" cy="511731"/>
           </a:xfrm>
           <a:prstGeom prst="rect">
             <a:avLst/>
           </a:prstGeom>
         </p:spPr>
         <p:txBody>
-          <a:bodyPr vert="horz" lIns="91440" tIns="45720" rIns="91440" bIns="45720" rtlCol="0" anchor="b"/>
+          <a:bodyPr vert="horz" lIns="94686" tIns="47343" rIns="94686" bIns="47343" rtlCol="0" anchor="b"/>
           <a:lstStyle>
             <a:lvl1pPr algn="r">
               <a:defRPr sz="1200"/>
@@ -895,21 +895,7 @@
           <a:bodyPr/>
           <a:lstStyle/>
           <a:p>
-            <a:pPr marL="0" marR="0" indent="0" algn="l" defTabSz="914400" rtl="0" eaLnBrk="1" fontAlgn="auto" latinLnBrk="0" hangingPunct="1">
-              <a:lnSpc>
-                <a:spcPct val="100000"/>
-              </a:lnSpc>
-              <a:spcBef>
-                <a:spcPts val="0"/>
-              </a:spcBef>
-              <a:spcAft>
-                <a:spcPts val="0"/>
-              </a:spcAft>
-              <a:buClrTx/>
-              <a:buSzTx/>
-              <a:buFontTx/>
-              <a:buNone/>
-              <a:tabLst/>
+            <a:pPr defTabSz="946861">
               <a:defRPr/>
             </a:pPr>
             <a:r>
@@ -943,21 +929,7 @@
             </a:r>
           </a:p>
           <a:p>
-            <a:pPr marL="0" marR="0" indent="0" algn="l" defTabSz="914400" rtl="0" eaLnBrk="1" fontAlgn="auto" latinLnBrk="0" hangingPunct="1">
-              <a:lnSpc>
-                <a:spcPct val="100000"/>
-              </a:lnSpc>
-              <a:spcBef>
-                <a:spcPts val="0"/>
-              </a:spcBef>
-              <a:spcAft>
-                <a:spcPts val="0"/>
-              </a:spcAft>
-              <a:buClrTx/>
-              <a:buSzTx/>
-              <a:buFontTx/>
-              <a:buNone/>
-              <a:tabLst/>
+            <a:pPr defTabSz="946861">
               <a:defRPr/>
             </a:pPr>
             <a:r>
@@ -1305,712 +1277,404 @@
           <a:bodyPr/>
           <a:lstStyle/>
           <a:p>
-            <a:pPr marL="0" marR="0" indent="0" algn="l" defTabSz="457200" rtl="0" eaLnBrk="1" fontAlgn="auto" latinLnBrk="0" hangingPunct="1">
-              <a:lnSpc>
-                <a:spcPct val="100000"/>
-              </a:lnSpc>
-              <a:spcBef>
-                <a:spcPts val="0"/>
-              </a:spcBef>
-              <a:spcAft>
-                <a:spcPts val="0"/>
-              </a:spcAft>
-              <a:buClrTx/>
-              <a:buSzTx/>
-              <a:buFontTx/>
-              <a:buNone/>
-              <a:tabLst/>
+            <a:pPr defTabSz="473431">
               <a:defRPr/>
             </a:pPr>
             <a:r>
-              <a:rPr lang="en-US" sz="1000" i="0" baseline="0" dirty="0" smtClean="0"/>
+              <a:rPr lang="en-US" sz="1000" dirty="0"/>
               <a:t>Hypothesis can be proven by comparing expected results from Virtual Cycle of Mutual Learning.</a:t>
             </a:r>
           </a:p>
           <a:p>
-            <a:pPr marL="0" marR="0" indent="0" algn="l" defTabSz="457200" rtl="0" eaLnBrk="1" fontAlgn="auto" latinLnBrk="0" hangingPunct="1">
-              <a:lnSpc>
-                <a:spcPct val="100000"/>
-              </a:lnSpc>
-              <a:spcBef>
-                <a:spcPts val="0"/>
-              </a:spcBef>
-              <a:spcAft>
-                <a:spcPts val="0"/>
-              </a:spcAft>
-              <a:buClrTx/>
-              <a:buSzTx/>
-              <a:buFontTx/>
-              <a:buNone/>
-              <a:tabLst/>
+            <a:pPr defTabSz="473431">
               <a:defRPr/>
             </a:pPr>
-            <a:endParaRPr lang="en-US" sz="1000" i="0" baseline="0" dirty="0" smtClean="0"/>
-          </a:p>
-          <a:p>
-            <a:r>
-              <a:rPr lang="en-US" sz="1000" baseline="0" dirty="0" smtClean="0"/>
+            <a:endParaRPr lang="en-US" sz="1000" dirty="0"/>
+          </a:p>
+          <a:p>
+            <a:r>
+              <a:rPr lang="en-US" sz="1000" dirty="0"/>
               <a:t>About the Mutual Learning Scale:</a:t>
             </a:r>
           </a:p>
           <a:p>
-            <a:pPr marL="171450" indent="-171450">
+            <a:pPr marL="177536" indent="-177536">
               <a:buFont typeface="Arial"/>
               <a:buChar char="•"/>
             </a:pPr>
             <a:r>
-              <a:rPr lang="en-US" sz="1000" baseline="0" dirty="0" smtClean="0"/>
+              <a:rPr lang="en-US" sz="1000" dirty="0"/>
               <a:t>The first 5 statements are the assumptions from Chris Argyris’s Mutual Learning Mindset</a:t>
             </a:r>
           </a:p>
           <a:p>
-            <a:pPr marL="171450" indent="-171450">
+            <a:pPr marL="177536" indent="-177536">
               <a:buFont typeface="Arial"/>
               <a:buChar char="•"/>
             </a:pPr>
             <a:r>
-              <a:rPr lang="en-US" sz="1000" baseline="0" dirty="0" smtClean="0"/>
+              <a:rPr lang="en-US" sz="1000" dirty="0"/>
               <a:t>The next 8 statements are the behaviours from Schwarz.</a:t>
             </a:r>
           </a:p>
           <a:p>
-            <a:pPr marL="171450" indent="-171450">
+            <a:pPr marL="177536" indent="-177536">
               <a:buFont typeface="Arial"/>
               <a:buChar char="•"/>
             </a:pPr>
-            <a:endParaRPr lang="en-US" sz="1000" baseline="0" dirty="0" smtClean="0"/>
-          </a:p>
-          <a:p>
-            <a:pPr marL="0" indent="0">
-              <a:buFont typeface="Arial"/>
-              <a:buNone/>
-            </a:pPr>
-            <a:r>
-              <a:rPr lang="en-US" sz="1000" baseline="0" dirty="0" smtClean="0"/>
+            <a:endParaRPr lang="en-US" sz="1000" dirty="0"/>
+          </a:p>
+          <a:p>
+            <a:r>
+              <a:rPr lang="en-US" sz="1000" dirty="0"/>
               <a:t>How does the scoring work?</a:t>
             </a:r>
           </a:p>
           <a:p>
-            <a:pPr marL="0" indent="0">
-              <a:buFont typeface="Arial"/>
-              <a:buNone/>
-            </a:pPr>
-            <a:endParaRPr lang="en-US" sz="1000" baseline="0" dirty="0" smtClean="0"/>
-          </a:p>
-          <a:p>
-            <a:pPr marL="0" indent="0">
-              <a:buFont typeface="Arial"/>
-              <a:buNone/>
-            </a:pPr>
-            <a:r>
-              <a:rPr lang="en-US" sz="1000" baseline="0" dirty="0" smtClean="0"/>
+            <a:endParaRPr lang="en-US" sz="1000" dirty="0"/>
+          </a:p>
+          <a:p>
+            <a:r>
+              <a:rPr lang="en-US" sz="1000" dirty="0"/>
               <a:t>Score for mindset range from:</a:t>
             </a:r>
           </a:p>
           <a:p>
-            <a:pPr marL="171450" indent="-171450">
+            <a:pPr marL="177536" indent="-177536">
               <a:buFont typeface="Arial"/>
               <a:buChar char="•"/>
             </a:pPr>
             <a:r>
-              <a:rPr lang="en-US" sz="1000" baseline="0" dirty="0" smtClean="0"/>
+              <a:rPr lang="en-US" sz="1000" dirty="0"/>
               <a:t>5 = Don’t apply values</a:t>
             </a:r>
           </a:p>
           <a:p>
-            <a:pPr marL="171450" indent="-171450">
+            <a:pPr marL="177536" indent="-177536">
               <a:buFont typeface="Arial"/>
               <a:buChar char="•"/>
             </a:pPr>
             <a:r>
-              <a:rPr lang="en-US" sz="1000" baseline="0" dirty="0" smtClean="0"/>
+              <a:rPr lang="en-US" sz="1000" dirty="0"/>
               <a:t>10 = Rarely apply values</a:t>
             </a:r>
           </a:p>
           <a:p>
-            <a:pPr marL="171450" indent="-171450">
+            <a:pPr marL="177536" indent="-177536">
               <a:buFont typeface="Arial"/>
               <a:buChar char="•"/>
             </a:pPr>
             <a:r>
-              <a:rPr lang="en-US" sz="1000" baseline="0" dirty="0" smtClean="0"/>
+              <a:rPr lang="en-US" sz="1000" dirty="0"/>
               <a:t>15 = Mostly apply values</a:t>
             </a:r>
           </a:p>
           <a:p>
-            <a:pPr marL="171450" indent="-171450">
+            <a:pPr marL="177536" indent="-177536">
               <a:buFont typeface="Arial"/>
               <a:buChar char="•"/>
             </a:pPr>
             <a:r>
-              <a:rPr lang="en-US" sz="1000" baseline="0" dirty="0" smtClean="0"/>
+              <a:rPr lang="en-US" sz="1000" dirty="0"/>
               <a:t>20 = Always apply values</a:t>
             </a:r>
           </a:p>
           <a:p>
-            <a:pPr marL="0" indent="0">
-              <a:buFont typeface="Arial"/>
-              <a:buNone/>
-            </a:pPr>
-            <a:endParaRPr lang="en-US" sz="1000" baseline="0" dirty="0" smtClean="0"/>
-          </a:p>
-          <a:p>
-            <a:pPr marL="0" indent="0">
-              <a:buFont typeface="Arial"/>
-              <a:buNone/>
-            </a:pPr>
-            <a:r>
-              <a:rPr lang="en-US" sz="1000" baseline="0" dirty="0" smtClean="0"/>
+            <a:endParaRPr lang="en-US" sz="1000" dirty="0"/>
+          </a:p>
+          <a:p>
+            <a:r>
+              <a:rPr lang="en-US" sz="1000" dirty="0"/>
               <a:t>Score for behaviours range from:</a:t>
             </a:r>
           </a:p>
           <a:p>
-            <a:pPr marL="0" indent="0">
-              <a:buFont typeface="Arial"/>
-              <a:buNone/>
-            </a:pPr>
-            <a:r>
-              <a:rPr lang="en-US" sz="1000" baseline="0" dirty="0" smtClean="0"/>
+            <a:r>
+              <a:rPr lang="en-US" sz="1000" dirty="0"/>
               <a:t>8 = Don’t apply behaviours</a:t>
             </a:r>
           </a:p>
           <a:p>
-            <a:pPr marL="0" indent="0">
-              <a:buFont typeface="Arial"/>
-              <a:buNone/>
-            </a:pPr>
-            <a:r>
-              <a:rPr lang="en-US" sz="1000" baseline="0" dirty="0" smtClean="0"/>
+            <a:r>
+              <a:rPr lang="en-US" sz="1000" dirty="0"/>
               <a:t>16 = Rarely apply behaviours</a:t>
             </a:r>
           </a:p>
           <a:p>
-            <a:pPr marL="0" indent="0">
-              <a:buFont typeface="Arial"/>
-              <a:buNone/>
-            </a:pPr>
-            <a:r>
-              <a:rPr lang="en-US" sz="1000" baseline="0" dirty="0" smtClean="0"/>
+            <a:r>
+              <a:rPr lang="en-US" sz="1000" dirty="0"/>
               <a:t>24 = Mostly apply behaviours</a:t>
             </a:r>
           </a:p>
           <a:p>
-            <a:pPr marL="0" indent="0">
-              <a:buFont typeface="Arial"/>
-              <a:buNone/>
-            </a:pPr>
-            <a:r>
-              <a:rPr lang="en-US" sz="1000" baseline="0" dirty="0" smtClean="0"/>
+            <a:r>
+              <a:rPr lang="en-US" sz="1000" dirty="0"/>
               <a:t>32 = Always apply behaviours</a:t>
             </a:r>
           </a:p>
           <a:p>
-            <a:pPr marL="0" indent="0">
-              <a:buFont typeface="Arial"/>
-              <a:buNone/>
-            </a:pPr>
-            <a:r>
-              <a:rPr lang="en-US" sz="1000" baseline="0" dirty="0" smtClean="0"/>
+            <a:r>
+              <a:rPr lang="en-US" sz="1000" dirty="0"/>
               <a:t> </a:t>
             </a:r>
           </a:p>
           <a:p>
-            <a:pPr marL="0" indent="0">
-              <a:buFont typeface="Arial"/>
-              <a:buNone/>
-            </a:pPr>
-            <a:r>
-              <a:rPr lang="en-US" sz="1000" baseline="0" dirty="0" smtClean="0"/>
+            <a:r>
+              <a:rPr lang="en-US" sz="1000" dirty="0"/>
               <a:t>Maximum congruence scores:</a:t>
             </a:r>
           </a:p>
           <a:p>
-            <a:pPr marL="0" indent="0">
-              <a:buFont typeface="Arial"/>
-              <a:buNone/>
-            </a:pPr>
-            <a:r>
-              <a:rPr lang="en-US" sz="1000" baseline="0" dirty="0" smtClean="0"/>
+            <a:r>
+              <a:rPr lang="en-US" sz="1000" dirty="0"/>
               <a:t>13 = 100% UC</a:t>
             </a:r>
           </a:p>
           <a:p>
-            <a:pPr marL="0" indent="0">
-              <a:buFont typeface="Arial"/>
-              <a:buNone/>
-            </a:pPr>
-            <a:r>
-              <a:rPr lang="en-US" sz="1000" baseline="0" dirty="0" smtClean="0"/>
+            <a:r>
+              <a:rPr lang="en-US" sz="1000" dirty="0"/>
               <a:t>26 = Mostly UC</a:t>
             </a:r>
           </a:p>
           <a:p>
-            <a:pPr marL="0" indent="0">
-              <a:buFont typeface="Arial"/>
-              <a:buNone/>
-            </a:pPr>
-            <a:r>
-              <a:rPr lang="en-US" sz="1000" baseline="0" dirty="0" smtClean="0"/>
+            <a:r>
+              <a:rPr lang="en-US" sz="1000" dirty="0"/>
               <a:t>39 = Mostly ML</a:t>
             </a:r>
           </a:p>
           <a:p>
-            <a:pPr marL="0" indent="0">
-              <a:buFont typeface="Arial"/>
-              <a:buNone/>
-            </a:pPr>
-            <a:r>
-              <a:rPr lang="en-US" sz="1000" baseline="0" dirty="0" smtClean="0"/>
+            <a:r>
+              <a:rPr lang="en-US" sz="1000" dirty="0"/>
               <a:t>52 = 100% ML</a:t>
             </a:r>
           </a:p>
           <a:p>
-            <a:pPr marL="0" marR="0" indent="0" algn="l" defTabSz="457200" rtl="0" eaLnBrk="1" fontAlgn="auto" latinLnBrk="0" hangingPunct="1">
-              <a:lnSpc>
-                <a:spcPct val="100000"/>
-              </a:lnSpc>
-              <a:spcBef>
-                <a:spcPts val="0"/>
-              </a:spcBef>
-              <a:spcAft>
-                <a:spcPts val="0"/>
-              </a:spcAft>
-              <a:buClrTx/>
-              <a:buSzTx/>
-              <a:buFontTx/>
-              <a:buNone/>
-              <a:tabLst/>
+            <a:pPr defTabSz="473431">
               <a:defRPr/>
             </a:pPr>
-            <a:endParaRPr lang="en-US" sz="1000" i="0" baseline="0" dirty="0" smtClean="0"/>
-          </a:p>
-          <a:p>
-            <a:pPr marL="0" marR="0" indent="0" algn="l" defTabSz="457200" rtl="0" eaLnBrk="1" fontAlgn="auto" latinLnBrk="0" hangingPunct="1">
-              <a:lnSpc>
-                <a:spcPct val="100000"/>
-              </a:lnSpc>
-              <a:spcBef>
-                <a:spcPts val="0"/>
-              </a:spcBef>
-              <a:spcAft>
-                <a:spcPts val="0"/>
-              </a:spcAft>
-              <a:buClrTx/>
-              <a:buSzTx/>
-              <a:buFontTx/>
-              <a:buNone/>
-              <a:tabLst/>
+            <a:endParaRPr lang="en-US" sz="1000" dirty="0"/>
+          </a:p>
+          <a:p>
+            <a:pPr defTabSz="473431">
               <a:defRPr/>
             </a:pPr>
             <a:r>
-              <a:rPr lang="en-US" sz="1000" i="0" baseline="0" dirty="0" smtClean="0"/>
+              <a:rPr lang="en-US" sz="1000" dirty="0"/>
               <a:t>So how did you score on the Mutual Learning Scale?</a:t>
             </a:r>
           </a:p>
           <a:p>
-            <a:endParaRPr lang="en-US" sz="1000" i="0" dirty="0" smtClean="0"/>
-          </a:p>
-          <a:p>
-            <a:r>
-              <a:rPr lang="en-US" sz="1000" i="0" dirty="0" smtClean="0"/>
-              <a:t>If you scored a total of 52 points, stand up. This is</a:t>
-            </a:r>
-            <a:r>
-              <a:rPr lang="en-US" sz="1000" i="0" baseline="0" dirty="0" smtClean="0"/>
-              <a:t> the highest possible score on the scale and means you’re congruent in your espoused theory and theory in practice.</a:t>
-            </a:r>
-          </a:p>
-          <a:p>
-            <a:pPr marL="0" marR="0" indent="0" algn="l" defTabSz="457200" rtl="0" eaLnBrk="1" fontAlgn="auto" latinLnBrk="0" hangingPunct="1">
-              <a:lnSpc>
-                <a:spcPct val="100000"/>
-              </a:lnSpc>
-              <a:spcBef>
-                <a:spcPts val="0"/>
-              </a:spcBef>
-              <a:spcAft>
-                <a:spcPts val="0"/>
-              </a:spcAft>
-              <a:buClrTx/>
-              <a:buSzTx/>
-              <a:buFontTx/>
-              <a:buNone/>
-              <a:tabLst/>
+            <a:endParaRPr lang="en-US" sz="1000" dirty="0"/>
+          </a:p>
+          <a:p>
+            <a:r>
+              <a:rPr lang="en-US" sz="1000" dirty="0"/>
+              <a:t>If you scored a total of 52 points, stand up. This is the highest possible score on the scale and means you’re congruent in your espoused theory and theory in practice.</a:t>
+            </a:r>
+          </a:p>
+          <a:p>
+            <a:pPr defTabSz="473431">
               <a:defRPr/>
             </a:pPr>
             <a:r>
-              <a:rPr lang="en-US" sz="1000" i="0" baseline="0" dirty="0" smtClean="0"/>
+              <a:rPr lang="en-US" sz="1000" dirty="0"/>
               <a:t>You believe in your ML talk AND you talk the talk and walk the walk all the time.</a:t>
             </a:r>
           </a:p>
           <a:p>
-            <a:pPr marL="0" marR="0" indent="0" algn="l" defTabSz="457200" rtl="0" eaLnBrk="1" fontAlgn="auto" latinLnBrk="0" hangingPunct="1">
-              <a:lnSpc>
-                <a:spcPct val="100000"/>
-              </a:lnSpc>
-              <a:spcBef>
-                <a:spcPts val="0"/>
-              </a:spcBef>
-              <a:spcAft>
-                <a:spcPts val="0"/>
-              </a:spcAft>
-              <a:buClrTx/>
-              <a:buSzTx/>
-              <a:buFontTx/>
-              <a:buNone/>
-              <a:tabLst/>
+            <a:pPr defTabSz="473431">
               <a:defRPr/>
             </a:pPr>
-            <a:endParaRPr lang="en-US" sz="1000" i="0" baseline="0" dirty="0" smtClean="0"/>
-          </a:p>
-          <a:p>
-            <a:pPr marL="0" marR="0" indent="0" algn="l" defTabSz="457200" rtl="0" eaLnBrk="1" fontAlgn="auto" latinLnBrk="0" hangingPunct="1">
-              <a:lnSpc>
-                <a:spcPct val="100000"/>
-              </a:lnSpc>
-              <a:spcBef>
-                <a:spcPts val="0"/>
-              </a:spcBef>
-              <a:spcAft>
-                <a:spcPts val="0"/>
-              </a:spcAft>
-              <a:buClrTx/>
-              <a:buSzTx/>
-              <a:buFontTx/>
-              <a:buNone/>
-              <a:tabLst/>
+            <a:endParaRPr lang="en-US" sz="1000" dirty="0"/>
+          </a:p>
+          <a:p>
+            <a:pPr defTabSz="473431">
               <a:defRPr/>
             </a:pPr>
             <a:r>
-              <a:rPr lang="en-US" sz="1000" i="0" baseline="0" dirty="0" smtClean="0"/>
+              <a:rPr lang="en-US" sz="1000" dirty="0"/>
               <a:t>Let’s drill down into the significance of more results by looking at time in pairs: mindset and behaviours.</a:t>
             </a:r>
           </a:p>
           <a:p>
-            <a:pPr marL="0" marR="0" indent="0" algn="l" defTabSz="457200" rtl="0" eaLnBrk="1" fontAlgn="auto" latinLnBrk="0" hangingPunct="1">
-              <a:lnSpc>
-                <a:spcPct val="100000"/>
-              </a:lnSpc>
-              <a:spcBef>
-                <a:spcPts val="0"/>
-              </a:spcBef>
-              <a:spcAft>
-                <a:spcPts val="0"/>
-              </a:spcAft>
-              <a:buClrTx/>
-              <a:buSzTx/>
-              <a:buFontTx/>
-              <a:buNone/>
-              <a:tabLst/>
+            <a:pPr defTabSz="473431">
               <a:defRPr/>
             </a:pPr>
             <a:r>
-              <a:rPr lang="en-US" sz="1000" i="0" baseline="0" dirty="0" smtClean="0"/>
+              <a:rPr lang="en-US" sz="1000" dirty="0"/>
               <a:t>On the one hand, if you scored 20 points for questions 1-5, you score yourself maximum on ML mindset and:</a:t>
             </a:r>
           </a:p>
           <a:p>
-            <a:pPr marL="171450" marR="0" indent="-171450" algn="l" defTabSz="457200" rtl="0" eaLnBrk="1" fontAlgn="auto" latinLnBrk="0" hangingPunct="1">
-              <a:lnSpc>
-                <a:spcPct val="100000"/>
-              </a:lnSpc>
-              <a:spcBef>
-                <a:spcPts val="0"/>
-              </a:spcBef>
-              <a:spcAft>
-                <a:spcPts val="0"/>
-              </a:spcAft>
-              <a:buClrTx/>
-              <a:buSzTx/>
+            <a:pPr marL="177536" indent="-177536" defTabSz="473431">
               <a:buFont typeface="Arial"/>
               <a:buChar char="•"/>
-              <a:tabLst/>
               <a:defRPr/>
             </a:pPr>
             <a:r>
-              <a:rPr lang="en-US" sz="1000" i="0" baseline="0" dirty="0" smtClean="0"/>
+              <a:rPr lang="en-US" sz="1000" dirty="0"/>
               <a:t>For questions 6-13:</a:t>
             </a:r>
           </a:p>
           <a:p>
-            <a:pPr marL="628650" marR="0" lvl="1" indent="-171450" algn="l" defTabSz="457200" rtl="0" eaLnBrk="1" fontAlgn="auto" latinLnBrk="0" hangingPunct="1">
-              <a:lnSpc>
-                <a:spcPct val="100000"/>
-              </a:lnSpc>
-              <a:spcBef>
-                <a:spcPts val="0"/>
-              </a:spcBef>
-              <a:spcAft>
-                <a:spcPts val="0"/>
-              </a:spcAft>
-              <a:buClrTx/>
-              <a:buSzTx/>
+            <a:pPr marL="650967" lvl="1" indent="-177536" defTabSz="473431">
               <a:buFont typeface="Arial"/>
               <a:buChar char="•"/>
-              <a:tabLst/>
               <a:defRPr/>
             </a:pPr>
             <a:r>
-              <a:rPr lang="en-US" sz="1000" i="0" baseline="0" dirty="0" smtClean="0"/>
+              <a:rPr lang="en-US" sz="1000" dirty="0"/>
               <a:t>If you scored 24 or higher, this means your preference is mostly ML. You believe in your ML talk AND you can talk the talk and do walk the walk most of the time.</a:t>
             </a:r>
           </a:p>
           <a:p>
-            <a:pPr marL="628650" marR="0" lvl="1" indent="-171450" algn="l" defTabSz="457200" rtl="0" eaLnBrk="1" fontAlgn="auto" latinLnBrk="0" hangingPunct="1">
-              <a:lnSpc>
-                <a:spcPct val="100000"/>
-              </a:lnSpc>
-              <a:spcBef>
-                <a:spcPts val="0"/>
-              </a:spcBef>
-              <a:spcAft>
-                <a:spcPts val="0"/>
-              </a:spcAft>
-              <a:buClrTx/>
-              <a:buSzTx/>
+            <a:pPr marL="650967" lvl="1" indent="-177536" defTabSz="473431">
               <a:buFont typeface="Arial"/>
               <a:buChar char="•"/>
-              <a:tabLst/>
               <a:defRPr/>
             </a:pPr>
             <a:r>
-              <a:rPr lang="en-US" sz="1000" i="0" baseline="0" dirty="0" smtClean="0"/>
+              <a:rPr lang="en-US" sz="1000" dirty="0"/>
               <a:t>If you scored 16-23, your behaviour straddles between UC and ML. You believe in your ML talk AND you fluctuate between UC and ML in behaviour. </a:t>
             </a:r>
           </a:p>
           <a:p>
-            <a:pPr marL="628650" marR="0" lvl="1" indent="-171450" algn="l" defTabSz="457200" rtl="0" eaLnBrk="1" fontAlgn="auto" latinLnBrk="0" hangingPunct="1">
-              <a:lnSpc>
-                <a:spcPct val="100000"/>
-              </a:lnSpc>
-              <a:spcBef>
-                <a:spcPts val="0"/>
-              </a:spcBef>
-              <a:spcAft>
-                <a:spcPts val="0"/>
-              </a:spcAft>
-              <a:buClrTx/>
-              <a:buSzTx/>
+            <a:pPr marL="650967" lvl="1" indent="-177536" defTabSz="473431">
               <a:buFont typeface="Arial"/>
               <a:buChar char="•"/>
-              <a:tabLst/>
               <a:defRPr/>
             </a:pPr>
             <a:r>
-              <a:rPr lang="en-US" sz="1000" i="0" baseline="0" dirty="0" smtClean="0"/>
+              <a:rPr lang="en-US" sz="1000" dirty="0"/>
               <a:t>If you scored 8-15, your belief in ML is in strong contradiction with your predominantly UC behaviour.</a:t>
             </a:r>
           </a:p>
           <a:p>
-            <a:pPr marL="0" marR="0" lvl="0" indent="0" algn="l" defTabSz="457200" rtl="0" eaLnBrk="1" fontAlgn="auto" latinLnBrk="0" hangingPunct="1">
-              <a:lnSpc>
-                <a:spcPct val="100000"/>
-              </a:lnSpc>
-              <a:spcBef>
-                <a:spcPts val="0"/>
-              </a:spcBef>
-              <a:spcAft>
-                <a:spcPts val="0"/>
-              </a:spcAft>
-              <a:buClrTx/>
-              <a:buSzTx/>
-              <a:buFont typeface="Arial"/>
-              <a:buNone/>
-              <a:tabLst/>
+            <a:pPr defTabSz="473431">
               <a:defRPr/>
             </a:pPr>
-            <a:endParaRPr lang="en-US" sz="1000" i="0" baseline="0" dirty="0" smtClean="0"/>
-          </a:p>
-          <a:p>
-            <a:pPr marL="0" marR="0" lvl="0" indent="0" algn="l" defTabSz="457200" rtl="0" eaLnBrk="1" fontAlgn="auto" latinLnBrk="0" hangingPunct="1">
-              <a:lnSpc>
-                <a:spcPct val="100000"/>
-              </a:lnSpc>
-              <a:spcBef>
-                <a:spcPts val="0"/>
-              </a:spcBef>
-              <a:spcAft>
-                <a:spcPts val="0"/>
-              </a:spcAft>
-              <a:buClrTx/>
-              <a:buSzTx/>
-              <a:buFont typeface="Arial"/>
-              <a:buNone/>
-              <a:tabLst/>
+            <a:endParaRPr lang="en-US" sz="1000" dirty="0"/>
+          </a:p>
+          <a:p>
+            <a:pPr defTabSz="473431">
               <a:defRPr/>
             </a:pPr>
             <a:r>
-              <a:rPr lang="en-US" sz="1000" i="0" baseline="0" dirty="0" smtClean="0"/>
+              <a:rPr lang="en-US" sz="1000" dirty="0"/>
               <a:t>On the other hand, if you scored between 5 and 10 for questions 1-5, you believe in UC AND you talk the talk and walk the walk all the time.</a:t>
             </a:r>
           </a:p>
           <a:p>
-            <a:endParaRPr lang="en-US" sz="1000" i="0" baseline="0" dirty="0" smtClean="0"/>
-          </a:p>
-          <a:p>
-            <a:r>
-              <a:rPr lang="en-US" sz="1000" i="0" baseline="0" dirty="0" smtClean="0"/>
+            <a:endParaRPr lang="en-US" sz="1000" dirty="0"/>
+          </a:p>
+          <a:p>
+            <a:r>
+              <a:rPr lang="en-US" sz="1000" dirty="0"/>
               <a:t>So – why did I ask you to share your score?</a:t>
             </a:r>
           </a:p>
           <a:p>
-            <a:endParaRPr lang="en-US" sz="1000" i="0" baseline="0" dirty="0" smtClean="0"/>
-          </a:p>
-          <a:p>
-            <a:r>
-              <a:rPr lang="en-US" sz="1000" i="0" baseline="0" dirty="0" smtClean="0"/>
+            <a:endParaRPr lang="en-US" sz="1000" dirty="0"/>
+          </a:p>
+          <a:p>
+            <a:r>
+              <a:rPr lang="en-US" sz="1000" dirty="0"/>
               <a:t>The main reason is to create the option for you to find the practitioners of ML during the break and get tips on how to live and breathe the Mutual Learning Model and 8 behaviours, even under stress.</a:t>
             </a:r>
           </a:p>
           <a:p>
-            <a:endParaRPr lang="en-US" sz="1000" i="0" baseline="0" dirty="0" smtClean="0"/>
-          </a:p>
-          <a:p>
-            <a:r>
-              <a:rPr lang="en-US" sz="1000" i="0" baseline="0" dirty="0" smtClean="0"/>
+            <a:endParaRPr lang="en-US" sz="1000" dirty="0"/>
+          </a:p>
+          <a:p>
+            <a:r>
+              <a:rPr lang="en-US" sz="1000" dirty="0"/>
               <a:t>Thank you. Everyone take a sit.</a:t>
             </a:r>
           </a:p>
           <a:p>
-            <a:endParaRPr lang="en-US" sz="1000" i="0" baseline="0" dirty="0" smtClean="0"/>
-          </a:p>
-          <a:p>
-            <a:r>
-              <a:rPr lang="en-US" sz="1000" i="0" baseline="0" dirty="0" smtClean="0"/>
+            <a:endParaRPr lang="en-US" sz="1000" dirty="0"/>
+          </a:p>
+          <a:p>
+            <a:r>
+              <a:rPr lang="en-US" sz="1000" dirty="0"/>
               <a:t>Let’s look at the findings in greater detail. If you scored 15 for mindset and 24 for behaviour, it means you are congruent in applying Mutual learning most of the time. The results you get from your efforts should reflect this.</a:t>
             </a:r>
           </a:p>
           <a:p>
-            <a:endParaRPr lang="en-US" sz="1000" i="0" baseline="0" dirty="0" smtClean="0"/>
-          </a:p>
-          <a:p>
-            <a:pPr marL="0" marR="0" indent="0" algn="l" defTabSz="457200" rtl="0" eaLnBrk="1" fontAlgn="auto" latinLnBrk="0" hangingPunct="1">
-              <a:lnSpc>
-                <a:spcPct val="100000"/>
-              </a:lnSpc>
-              <a:spcBef>
-                <a:spcPts val="0"/>
-              </a:spcBef>
-              <a:spcAft>
-                <a:spcPts val="0"/>
-              </a:spcAft>
-              <a:buClrTx/>
-              <a:buSzTx/>
-              <a:buFontTx/>
-              <a:buNone/>
-              <a:tabLst/>
+            <a:endParaRPr lang="en-US" sz="1000" dirty="0"/>
+          </a:p>
+          <a:p>
+            <a:pPr defTabSz="473431">
               <a:defRPr/>
             </a:pPr>
             <a:r>
-              <a:rPr lang="en-US" sz="1000" i="0" baseline="0" dirty="0" smtClean="0"/>
+              <a:rPr lang="en-US" sz="1000" dirty="0"/>
               <a:t>If you scored higher in behaviour than mindset, it means you actively apply the Mutual Learning behaviours without really applying the mindset. You talk the talk and walk the walk but you don’t quite believe in the ML mindset. Nonetheless, starting to change your behaviour can be an easier way to changing your mindset. As Amy Cuddy, psychologist famous for her Ted talk on the Power Pose and the body influencing the mind, it’s about "Fake it until you become it."</a:t>
             </a:r>
           </a:p>
           <a:p>
-            <a:endParaRPr lang="en-US" sz="1000" i="0" baseline="0" dirty="0" smtClean="0"/>
-          </a:p>
-          <a:p>
-            <a:r>
-              <a:rPr lang="en-US" sz="1000" i="0" baseline="0" dirty="0" smtClean="0"/>
+            <a:endParaRPr lang="en-US" sz="1000" dirty="0"/>
+          </a:p>
+          <a:p>
+            <a:r>
+              <a:rPr lang="en-US" sz="1000" dirty="0"/>
               <a:t>If you scored higher in mindset than behaviour, it means that you believe strongly in the Mutual Learning mindset yet don’t apply the behaviours fully in practice all of the time. This is a strong position to be in, however, belief needs to result in corresponding behaviour to be effective. Monitor your theory in practice for discrepancies to your ML mindset to increase your practice of ML behaviour more often, especially when under stress.</a:t>
             </a:r>
           </a:p>
           <a:p>
-            <a:endParaRPr lang="en-US" sz="1000" i="0" baseline="0" dirty="0" smtClean="0"/>
-          </a:p>
-          <a:p>
-            <a:r>
-              <a:rPr lang="en-US" sz="1000" b="1" i="0" baseline="0" dirty="0" smtClean="0"/>
+            <a:endParaRPr lang="en-US" sz="1000" dirty="0"/>
+          </a:p>
+          <a:p>
+            <a:r>
+              <a:rPr lang="en-US" sz="1000" b="1" dirty="0"/>
               <a:t>How accurate is the Mutual Learning Scale?</a:t>
             </a:r>
-            <a:endParaRPr lang="en-US" sz="1000" b="0" i="0" baseline="0" dirty="0" smtClean="0"/>
-          </a:p>
-          <a:p>
-            <a:r>
-              <a:rPr lang="en-US" sz="1000" b="0" i="0" baseline="0" dirty="0" smtClean="0"/>
+            <a:endParaRPr lang="en-US" sz="1000" dirty="0"/>
+          </a:p>
+          <a:p>
+            <a:r>
+              <a:rPr lang="en-US" sz="1000" dirty="0"/>
               <a:t>It depends. We suggest taking your two scores and multiplying them by 3/5 each to calbrate it for how you think and act under stress.</a:t>
             </a:r>
           </a:p>
           <a:p>
-            <a:endParaRPr lang="en-US" sz="1000" b="0" i="0" baseline="0" dirty="0" smtClean="0"/>
-          </a:p>
-          <a:p>
-            <a:r>
-              <a:rPr lang="en-US" sz="1000" b="0" i="0" baseline="0" dirty="0" smtClean="0"/>
+            <a:endParaRPr lang="en-US" sz="1000" dirty="0"/>
+          </a:p>
+          <a:p>
+            <a:r>
+              <a:rPr lang="en-US" sz="1000" dirty="0"/>
               <a:t>For instance, if Annie scores 20/20 for mindset on a sunny day, under stress, she would more likely score 15/20.</a:t>
             </a:r>
           </a:p>
           <a:p>
-            <a:pPr marL="0" marR="0" indent="0" algn="l" defTabSz="914400" rtl="0" eaLnBrk="1" fontAlgn="auto" latinLnBrk="0" hangingPunct="1">
-              <a:lnSpc>
-                <a:spcPct val="100000"/>
-              </a:lnSpc>
-              <a:spcBef>
-                <a:spcPts val="0"/>
-              </a:spcBef>
-              <a:spcAft>
-                <a:spcPts val="0"/>
-              </a:spcAft>
-              <a:buClrTx/>
-              <a:buSzTx/>
-              <a:buFontTx/>
-              <a:buNone/>
-              <a:tabLst/>
+            <a:pPr defTabSz="946861">
               <a:defRPr/>
             </a:pPr>
             <a:r>
-              <a:rPr lang="en-US" sz="1000" b="0" i="0" baseline="0" dirty="0" smtClean="0"/>
+              <a:rPr lang="en-US" sz="1000" dirty="0"/>
               <a:t>For instance, if Annie scores 25/32 for mindset on a sunny day, under stress, she would more likely score 15/32.</a:t>
             </a:r>
           </a:p>
           <a:p>
-            <a:pPr marL="0" marR="0" indent="0" algn="l" defTabSz="914400" rtl="0" eaLnBrk="1" fontAlgn="auto" latinLnBrk="0" hangingPunct="1">
-              <a:lnSpc>
-                <a:spcPct val="100000"/>
-              </a:lnSpc>
-              <a:spcBef>
-                <a:spcPts val="0"/>
-              </a:spcBef>
-              <a:spcAft>
-                <a:spcPts val="0"/>
-              </a:spcAft>
-              <a:buClrTx/>
-              <a:buSzTx/>
-              <a:buFontTx/>
-              <a:buNone/>
-              <a:tabLst/>
+            <a:pPr defTabSz="946861">
               <a:defRPr/>
             </a:pPr>
-            <a:endParaRPr lang="en-US" sz="1000" b="0" i="0" baseline="0" dirty="0" smtClean="0"/>
-          </a:p>
-          <a:p>
-            <a:pPr marL="0" marR="0" indent="0" algn="l" defTabSz="914400" rtl="0" eaLnBrk="1" fontAlgn="auto" latinLnBrk="0" hangingPunct="1">
-              <a:lnSpc>
-                <a:spcPct val="100000"/>
-              </a:lnSpc>
-              <a:spcBef>
-                <a:spcPts val="0"/>
-              </a:spcBef>
-              <a:spcAft>
-                <a:spcPts val="0"/>
-              </a:spcAft>
-              <a:buClrTx/>
-              <a:buSzTx/>
-              <a:buFontTx/>
-              <a:buNone/>
-              <a:tabLst/>
+            <a:endParaRPr lang="en-US" sz="1000" dirty="0"/>
+          </a:p>
+          <a:p>
+            <a:pPr defTabSz="946861">
               <a:defRPr/>
             </a:pPr>
             <a:r>
-              <a:rPr lang="en-US" sz="1000" b="0" i="0" baseline="0" dirty="0" smtClean="0"/>
+              <a:rPr lang="en-US" sz="1000" dirty="0"/>
               <a:t>What we expect to see is a reduction by one level down, from “competent” to “advanced beginner” when Annie is under stress. Embedding Mutual Learning as a mindset is vital to ensure your best chances of congruent behaviour to get the desired results.</a:t>
             </a:r>
           </a:p>
           <a:p>
-            <a:endParaRPr lang="en-US" sz="1000" b="0" i="0" baseline="0" dirty="0" smtClean="0"/>
-          </a:p>
-          <a:p>
-            <a:endParaRPr lang="en-US" sz="1000" b="1" i="0" baseline="0" dirty="0" smtClean="0"/>
+            <a:endParaRPr lang="en-US" sz="1000" dirty="0"/>
+          </a:p>
+          <a:p>
+            <a:endParaRPr lang="en-US" sz="1000" b="1" dirty="0"/>
           </a:p>
         </p:txBody>
       </p:sp>
@@ -2513,8 +2177,8 @@
         </p:nvSpPr>
         <p:spPr>
           <a:xfrm>
-            <a:off x="931863" y="742950"/>
-            <a:ext cx="4957762" cy="3719513"/>
+            <a:off x="990600" y="766763"/>
+            <a:ext cx="5119688" cy="3838575"/>
           </a:xfrm>
         </p:spPr>
       </p:sp>
@@ -2579,8 +2243,8 @@
         </p:nvSpPr>
         <p:spPr>
           <a:xfrm>
-            <a:off x="931863" y="742950"/>
-            <a:ext cx="4957762" cy="3719513"/>
+            <a:off x="990600" y="766763"/>
+            <a:ext cx="5119688" cy="3838575"/>
           </a:xfrm>
           <a:custGeom>
             <a:avLst/>
@@ -2630,25 +2294,19 @@
         </p:nvSpPr>
         <p:spPr>
           <a:xfrm>
-            <a:off x="681992" y="4711383"/>
-            <a:ext cx="5455919" cy="4463415"/>
+            <a:off x="709933" y="4861442"/>
+            <a:ext cx="5679439" cy="4605576"/>
           </a:xfrm>
           <a:prstGeom prst="rect">
             <a:avLst/>
           </a:prstGeom>
         </p:spPr>
         <p:txBody>
-          <a:bodyPr lIns="91425" tIns="91425" rIns="91425" bIns="91425" anchor="t" anchorCtr="0">
+          <a:bodyPr lIns="94671" tIns="94671" rIns="94671" bIns="94671" anchor="t" anchorCtr="0">
             <a:noAutofit/>
           </a:bodyPr>
           <a:lstStyle/>
           <a:p>
-            <a:pPr>
-              <a:spcBef>
-                <a:spcPts val="0"/>
-              </a:spcBef>
-              <a:buNone/>
-            </a:pPr>
             <a:endParaRPr dirty="0"/>
           </a:p>
         </p:txBody>
@@ -3313,8 +2971,8 @@
         </p:nvSpPr>
         <p:spPr>
           <a:xfrm>
-            <a:off x="931863" y="742950"/>
-            <a:ext cx="4957762" cy="3719513"/>
+            <a:off x="990600" y="766763"/>
+            <a:ext cx="5119688" cy="3838575"/>
           </a:xfrm>
         </p:spPr>
       </p:sp>
@@ -22456,7 +22114,7 @@
               <a:rPr lang="en-US" sz="1250" i="1" dirty="0" smtClean="0">
                 <a:latin typeface="+mn-lt"/>
               </a:rPr>
-              <a:t>represents your views</a:t>
+              <a:t>represents your views, as you tell others.</a:t>
             </a:r>
             <a:endParaRPr lang="en-US" sz="1250" i="1" dirty="0" smtClean="0">
               <a:latin typeface="+mn-lt"/>
@@ -22491,15 +22149,19 @@
             </a:pPr>
             <a:r>
               <a:rPr lang="en-US" sz="1250" i="1" dirty="0"/>
-              <a:t>Find a neighbor, introduce yourself, </a:t>
+              <a:t>Find a </a:t>
             </a:r>
             <a:r>
               <a:rPr lang="en-US" sz="1250" i="1" dirty="0" smtClean="0"/>
-              <a:t>and talk with them about </a:t>
-            </a:r>
-            <a:r>
-              <a:rPr lang="en-US" sz="1250" i="1" smtClean="0"/>
-              <a:t>your choices.</a:t>
+              <a:t>neighbor you don't know, </a:t>
+            </a:r>
+            <a:r>
+              <a:rPr lang="en-US" sz="1250" i="1" dirty="0"/>
+              <a:t>introduce yourself, </a:t>
+            </a:r>
+            <a:r>
+              <a:rPr lang="en-US" sz="1250" i="1" dirty="0" smtClean="0"/>
+              <a:t>and talk with them about why you made your choices.</a:t>
             </a:r>
             <a:endParaRPr lang="en-US" sz="1250" i="1" dirty="0"/>
           </a:p>

</xml_diff>